<commit_message>
slides (visualnetkit component diagram)
</commit_message>
<xml_diff>
--- a/thesis_adf/presentazione_tesi/presentazione.pptx
+++ b/thesis_adf/presentazione_tesi/presentazione.pptx
@@ -924,6 +924,42 @@
         <a:bodyPr/>
         <a:lstStyle/>
         <a:p>
+          <a:r>
+            <a:rPr lang="en-US" dirty="0" err="1" smtClean="0"/>
+            <a:t>Nessun</a:t>
+          </a:r>
+          <a:r>
+            <a:rPr lang="en-US" dirty="0" smtClean="0"/>
+            <a:t> </a:t>
+          </a:r>
+          <a:r>
+            <a:rPr lang="en-US" dirty="0" err="1" smtClean="0"/>
+            <a:t>supporto</a:t>
+          </a:r>
+          <a:r>
+            <a:rPr lang="en-US" dirty="0" smtClean="0"/>
+            <a:t> </a:t>
+          </a:r>
+          <a:r>
+            <a:rPr lang="en-US" dirty="0" err="1" smtClean="0"/>
+            <a:t>alle</a:t>
+          </a:r>
+          <a:r>
+            <a:rPr lang="en-US" dirty="0" smtClean="0"/>
+            <a:t> </a:t>
+          </a:r>
+          <a:r>
+            <a:rPr lang="en-US" dirty="0" err="1" smtClean="0"/>
+            <a:t>configurazioni</a:t>
+          </a:r>
+          <a:r>
+            <a:rPr lang="en-US" dirty="0" smtClean="0"/>
+            <a:t> </a:t>
+          </a:r>
+          <a:r>
+            <a:rPr lang="en-US" dirty="0" err="1" smtClean="0"/>
+            <a:t>avanzate</a:t>
+          </a:r>
           <a:endParaRPr lang="it-IT" dirty="0"/>
         </a:p>
       </dgm:t>
@@ -988,12 +1024,48 @@
       </dgm:t>
     </dgm:pt>
     <dgm:pt modelId="{AF6C5FEC-B06D-47E2-8FDA-7DEAC90858E5}">
-      <dgm:prSet phldrT="[Testo]" phldr="1"/>
+      <dgm:prSet phldrT="[Testo]"/>
       <dgm:spPr/>
       <dgm:t>
         <a:bodyPr/>
         <a:lstStyle/>
         <a:p>
+          <a:r>
+            <a:rPr lang="en-US" dirty="0" err="1" smtClean="0"/>
+            <a:t>Nessun</a:t>
+          </a:r>
+          <a:r>
+            <a:rPr lang="en-US" dirty="0" smtClean="0"/>
+            <a:t> </a:t>
+          </a:r>
+          <a:r>
+            <a:rPr lang="en-US" dirty="0" err="1" smtClean="0"/>
+            <a:t>supporto</a:t>
+          </a:r>
+          <a:r>
+            <a:rPr lang="en-US" dirty="0" smtClean="0"/>
+            <a:t> </a:t>
+          </a:r>
+          <a:r>
+            <a:rPr lang="en-US" dirty="0" err="1" smtClean="0"/>
+            <a:t>alle</a:t>
+          </a:r>
+          <a:r>
+            <a:rPr lang="en-US" dirty="0" smtClean="0"/>
+            <a:t> </a:t>
+          </a:r>
+          <a:r>
+            <a:rPr lang="en-US" dirty="0" err="1" smtClean="0"/>
+            <a:t>configurazioni</a:t>
+          </a:r>
+          <a:r>
+            <a:rPr lang="en-US" dirty="0" smtClean="0"/>
+            <a:t> </a:t>
+          </a:r>
+          <a:r>
+            <a:rPr lang="en-US" dirty="0" err="1" smtClean="0"/>
+            <a:t>avanzate</a:t>
+          </a:r>
           <a:endParaRPr lang="it-IT" dirty="0"/>
         </a:p>
       </dgm:t>
@@ -1020,39 +1092,6 @@
         </a:p>
       </dgm:t>
     </dgm:pt>
-    <dgm:pt modelId="{2BD7B090-D898-4E65-9E50-1009FC591733}">
-      <dgm:prSet phldrT="[Testo]" phldr="1"/>
-      <dgm:spPr/>
-      <dgm:t>
-        <a:bodyPr/>
-        <a:lstStyle/>
-        <a:p>
-          <a:endParaRPr lang="it-IT" dirty="0"/>
-        </a:p>
-      </dgm:t>
-    </dgm:pt>
-    <dgm:pt modelId="{233E02C5-2B04-4FD8-8CA1-B56FF9259BC2}" type="parTrans" cxnId="{EF9C0B9D-45B2-4E1D-8DA7-6402EA473527}">
-      <dgm:prSet/>
-      <dgm:spPr/>
-      <dgm:t>
-        <a:bodyPr/>
-        <a:lstStyle/>
-        <a:p>
-          <a:endParaRPr lang="it-IT"/>
-        </a:p>
-      </dgm:t>
-    </dgm:pt>
-    <dgm:pt modelId="{983D3244-10E0-4901-910E-F4D9B80B0F42}" type="sibTrans" cxnId="{EF9C0B9D-45B2-4E1D-8DA7-6402EA473527}">
-      <dgm:prSet/>
-      <dgm:spPr/>
-      <dgm:t>
-        <a:bodyPr/>
-        <a:lstStyle/>
-        <a:p>
-          <a:endParaRPr lang="it-IT"/>
-        </a:p>
-      </dgm:t>
-    </dgm:pt>
     <dgm:pt modelId="{97831BA3-5392-4C40-9746-6020D803C42A}">
       <dgm:prSet phldrT="[Testo]"/>
       <dgm:spPr/>
@@ -1062,7 +1101,7 @@
         <a:p>
           <a:r>
             <a:rPr lang="en-US" dirty="0" err="1" smtClean="0"/>
-            <a:t>VnUML</a:t>
+            <a:t>VnUmlGUI</a:t>
           </a:r>
           <a:endParaRPr lang="it-IT" dirty="0"/>
         </a:p>
@@ -1091,12 +1130,72 @@
       </dgm:t>
     </dgm:pt>
     <dgm:pt modelId="{BF95EC57-5936-4974-A783-8279AA2DE17D}">
-      <dgm:prSet phldrT="[Testo]" phldr="1"/>
+      <dgm:prSet phldrT="[Testo]"/>
       <dgm:spPr/>
       <dgm:t>
         <a:bodyPr/>
         <a:lstStyle/>
         <a:p>
+          <a:r>
+            <a:rPr lang="en-US" dirty="0" err="1" smtClean="0"/>
+            <a:t>Semplice</a:t>
+          </a:r>
+          <a:r>
+            <a:rPr lang="en-US" dirty="0" smtClean="0"/>
+            <a:t> </a:t>
+          </a:r>
+          <a:r>
+            <a:rPr lang="en-US" dirty="0" err="1" smtClean="0"/>
+            <a:t>strumento</a:t>
+          </a:r>
+          <a:r>
+            <a:rPr lang="en-US" dirty="0" smtClean="0"/>
+            <a:t> per la </a:t>
+          </a:r>
+          <a:r>
+            <a:rPr lang="en-US" dirty="0" err="1" smtClean="0"/>
+            <a:t>creazione</a:t>
+          </a:r>
+          <a:r>
+            <a:rPr lang="en-US" dirty="0" smtClean="0"/>
+            <a:t> </a:t>
+          </a:r>
+          <a:r>
+            <a:rPr lang="en-US" dirty="0" err="1" smtClean="0"/>
+            <a:t>assistita</a:t>
+          </a:r>
+          <a:r>
+            <a:rPr lang="en-US" dirty="0" smtClean="0"/>
+            <a:t> </a:t>
+          </a:r>
+          <a:r>
+            <a:rPr lang="en-US" dirty="0" err="1" smtClean="0"/>
+            <a:t>della</a:t>
+          </a:r>
+          <a:r>
+            <a:rPr lang="en-US" dirty="0" smtClean="0"/>
+            <a:t> </a:t>
+          </a:r>
+          <a:r>
+            <a:rPr lang="en-US" dirty="0" err="1" smtClean="0"/>
+            <a:t>topologia</a:t>
+          </a:r>
+          <a:r>
+            <a:rPr lang="en-US" dirty="0" smtClean="0"/>
+            <a:t> </a:t>
+          </a:r>
+          <a:r>
+            <a:rPr lang="en-US" dirty="0" err="1" smtClean="0"/>
+            <a:t>di</a:t>
+          </a:r>
+          <a:r>
+            <a:rPr lang="en-US" dirty="0" smtClean="0"/>
+            <a:t> </a:t>
+          </a:r>
+          <a:r>
+            <a:rPr lang="en-US" dirty="0" err="1" smtClean="0"/>
+            <a:t>rete</a:t>
+          </a:r>
           <a:endParaRPr lang="it-IT" dirty="0"/>
         </a:p>
       </dgm:t>
@@ -1123,41 +1222,23 @@
         </a:p>
       </dgm:t>
     </dgm:pt>
-    <dgm:pt modelId="{61E8DC94-93CC-4EF5-890F-DC9F41836F92}">
-      <dgm:prSet phldrT="[Testo]" phldr="1"/>
-      <dgm:spPr/>
-      <dgm:t>
-        <a:bodyPr/>
-        <a:lstStyle/>
-        <a:p>
-          <a:endParaRPr lang="it-IT" dirty="0"/>
-        </a:p>
-      </dgm:t>
-    </dgm:pt>
-    <dgm:pt modelId="{F79AC635-C281-40F1-8832-20978D84E1F7}" type="parTrans" cxnId="{03B80E62-2126-4CB8-8FEE-594FD95CB979}">
-      <dgm:prSet/>
-      <dgm:spPr/>
-      <dgm:t>
-        <a:bodyPr/>
-        <a:lstStyle/>
-        <a:p>
-          <a:endParaRPr lang="it-IT"/>
-        </a:p>
-      </dgm:t>
-    </dgm:pt>
-    <dgm:pt modelId="{6BD9B842-A648-45BF-958A-8C811AF7F73B}" type="sibTrans" cxnId="{03B80E62-2126-4CB8-8FEE-594FD95CB979}">
-      <dgm:prSet/>
-      <dgm:spPr/>
-      <dgm:t>
-        <a:bodyPr/>
-        <a:lstStyle/>
-        <a:p>
-          <a:endParaRPr lang="it-IT"/>
-        </a:p>
-      </dgm:t>
-    </dgm:pt>
     <dgm:pt modelId="{AC875E57-01B9-490D-8E7B-3E4AA2A39890}">
-      <dgm:prSet phldrT="[Testo]"/>
+      <dgm:prSet phldrT="[Testo]">
+        <dgm:style>
+          <a:lnRef idx="0">
+            <a:schemeClr val="accent6"/>
+          </a:lnRef>
+          <a:fillRef idx="3">
+            <a:schemeClr val="accent6"/>
+          </a:fillRef>
+          <a:effectRef idx="3">
+            <a:schemeClr val="accent6"/>
+          </a:effectRef>
+          <a:fontRef idx="minor">
+            <a:schemeClr val="lt1"/>
+          </a:fontRef>
+        </dgm:style>
+      </dgm:prSet>
       <dgm:spPr/>
       <dgm:t>
         <a:bodyPr/>
@@ -1165,7 +1246,7 @@
         <a:p>
           <a:r>
             <a:rPr lang="en-US" dirty="0" err="1" smtClean="0"/>
-            <a:t>NetKit</a:t>
+            <a:t>VisualNetKit</a:t>
           </a:r>
           <a:endParaRPr lang="it-IT" dirty="0"/>
         </a:p>
@@ -1193,6 +1274,58 @@
         </a:p>
       </dgm:t>
     </dgm:pt>
+    <dgm:pt modelId="{26A77C95-5DF6-4719-ADEC-5EE891442978}">
+      <dgm:prSet phldrT="[Testo]">
+        <dgm:style>
+          <a:lnRef idx="1">
+            <a:schemeClr val="accent6"/>
+          </a:lnRef>
+          <a:fillRef idx="2">
+            <a:schemeClr val="accent6"/>
+          </a:fillRef>
+          <a:effectRef idx="1">
+            <a:schemeClr val="accent6"/>
+          </a:effectRef>
+          <a:fontRef idx="minor">
+            <a:schemeClr val="dk1"/>
+          </a:fontRef>
+        </dgm:style>
+      </dgm:prSet>
+      <dgm:spPr/>
+      <dgm:t>
+        <a:bodyPr/>
+        <a:lstStyle/>
+        <a:p>
+          <a:r>
+            <a:rPr lang="it-IT" dirty="0" smtClean="0"/>
+            <a:t>Supporto flessibile alle configurazioni avanzate</a:t>
+          </a:r>
+          <a:endParaRPr lang="it-IT" dirty="0"/>
+        </a:p>
+      </dgm:t>
+    </dgm:pt>
+    <dgm:pt modelId="{DB61F0F5-7D89-4879-B027-6DF244927978}" type="parTrans" cxnId="{AA919A95-63B0-4EF8-82C6-BAD6A90CB6E8}">
+      <dgm:prSet/>
+      <dgm:spPr/>
+      <dgm:t>
+        <a:bodyPr/>
+        <a:lstStyle/>
+        <a:p>
+          <a:endParaRPr lang="it-IT"/>
+        </a:p>
+      </dgm:t>
+    </dgm:pt>
+    <dgm:pt modelId="{B352306E-8147-4D96-AA3C-C1E01E0A2831}" type="sibTrans" cxnId="{AA919A95-63B0-4EF8-82C6-BAD6A90CB6E8}">
+      <dgm:prSet/>
+      <dgm:spPr/>
+      <dgm:t>
+        <a:bodyPr/>
+        <a:lstStyle/>
+        <a:p>
+          <a:endParaRPr lang="it-IT"/>
+        </a:p>
+      </dgm:t>
+    </dgm:pt>
     <dgm:pt modelId="{8707C7F1-5F37-4BF1-9329-5EE09FFDF905}" type="pres">
       <dgm:prSet presAssocID="{235B55A1-85F2-46BD-B188-6F06F5D4A171}" presName="Name0" presStyleCnt="0">
         <dgm:presLayoutVars>
@@ -1202,6 +1335,13 @@
         </dgm:presLayoutVars>
       </dgm:prSet>
       <dgm:spPr/>
+      <dgm:t>
+        <a:bodyPr/>
+        <a:lstStyle/>
+        <a:p>
+          <a:endParaRPr lang="it-IT"/>
+        </a:p>
+      </dgm:t>
     </dgm:pt>
     <dgm:pt modelId="{A27B2C76-E53D-47E6-B83F-9542B00CEDBB}" type="pres">
       <dgm:prSet presAssocID="{6C742048-B828-4B29-B8E8-E763F092B0E9}" presName="linNode" presStyleCnt="0"/>
@@ -1224,7 +1364,7 @@
       </dgm:t>
     </dgm:pt>
     <dgm:pt modelId="{B9328291-F94C-465E-BC05-BC968E4029C1}" type="pres">
-      <dgm:prSet presAssocID="{6C742048-B828-4B29-B8E8-E763F092B0E9}" presName="descendantText" presStyleLbl="alignAccFollowNode1" presStyleIdx="0" presStyleCnt="3">
+      <dgm:prSet presAssocID="{6C742048-B828-4B29-B8E8-E763F092B0E9}" presName="descendantText" presStyleLbl="alignAccFollowNode1" presStyleIdx="0" presStyleCnt="4">
         <dgm:presLayoutVars>
           <dgm:bulletEnabled val="1"/>
         </dgm:presLayoutVars>
@@ -1254,14 +1394,28 @@
         </dgm:presLayoutVars>
       </dgm:prSet>
       <dgm:spPr/>
+      <dgm:t>
+        <a:bodyPr/>
+        <a:lstStyle/>
+        <a:p>
+          <a:endParaRPr lang="it-IT"/>
+        </a:p>
+      </dgm:t>
     </dgm:pt>
     <dgm:pt modelId="{FFAECC64-C87B-4241-8414-259FAB795432}" type="pres">
-      <dgm:prSet presAssocID="{37BE8EAF-4D9C-45F0-ADFD-34D7679B5DCA}" presName="descendantText" presStyleLbl="alignAccFollowNode1" presStyleIdx="1" presStyleCnt="3">
+      <dgm:prSet presAssocID="{37BE8EAF-4D9C-45F0-ADFD-34D7679B5DCA}" presName="descendantText" presStyleLbl="alignAccFollowNode1" presStyleIdx="1" presStyleCnt="4">
         <dgm:presLayoutVars>
           <dgm:bulletEnabled val="1"/>
         </dgm:presLayoutVars>
       </dgm:prSet>
       <dgm:spPr/>
+      <dgm:t>
+        <a:bodyPr/>
+        <a:lstStyle/>
+        <a:p>
+          <a:endParaRPr lang="it-IT"/>
+        </a:p>
+      </dgm:t>
     </dgm:pt>
     <dgm:pt modelId="{BAAF50DF-CC4E-4A5C-98D0-0AD807959F77}" type="pres">
       <dgm:prSet presAssocID="{B6928DFE-C7BE-4838-A530-3C88A8919FF0}" presName="sp" presStyleCnt="0"/>
@@ -1279,9 +1433,16 @@
         </dgm:presLayoutVars>
       </dgm:prSet>
       <dgm:spPr/>
+      <dgm:t>
+        <a:bodyPr/>
+        <a:lstStyle/>
+        <a:p>
+          <a:endParaRPr lang="it-IT"/>
+        </a:p>
+      </dgm:t>
     </dgm:pt>
     <dgm:pt modelId="{3513A661-E049-49A7-A84B-CDE58BC128C9}" type="pres">
-      <dgm:prSet presAssocID="{97831BA3-5392-4C40-9746-6020D803C42A}" presName="descendantText" presStyleLbl="alignAccFollowNode1" presStyleIdx="2" presStyleCnt="3">
+      <dgm:prSet presAssocID="{97831BA3-5392-4C40-9746-6020D803C42A}" presName="descendantText" presStyleLbl="alignAccFollowNode1" presStyleIdx="2" presStyleCnt="4">
         <dgm:presLayoutVars>
           <dgm:bulletEnabled val="1"/>
         </dgm:presLayoutVars>
@@ -1311,18 +1472,39 @@
         </dgm:presLayoutVars>
       </dgm:prSet>
       <dgm:spPr/>
+      <dgm:t>
+        <a:bodyPr/>
+        <a:lstStyle/>
+        <a:p>
+          <a:endParaRPr lang="it-IT"/>
+        </a:p>
+      </dgm:t>
+    </dgm:pt>
+    <dgm:pt modelId="{73351229-0CD8-43A8-A43A-2D3D9582E716}" type="pres">
+      <dgm:prSet presAssocID="{AC875E57-01B9-490D-8E7B-3E4AA2A39890}" presName="descendantText" presStyleLbl="alignAccFollowNode1" presStyleIdx="3" presStyleCnt="4">
+        <dgm:presLayoutVars>
+          <dgm:bulletEnabled val="1"/>
+        </dgm:presLayoutVars>
+      </dgm:prSet>
+      <dgm:spPr/>
+      <dgm:t>
+        <a:bodyPr/>
+        <a:lstStyle/>
+        <a:p>
+          <a:endParaRPr lang="it-IT"/>
+        </a:p>
+      </dgm:t>
     </dgm:pt>
   </dgm:ptLst>
   <dgm:cxnLst>
     <dgm:cxn modelId="{E7C9EC05-60DC-4B17-8263-586FD8FD257D}" type="presOf" srcId="{97831BA3-5392-4C40-9746-6020D803C42A}" destId="{7A790736-225B-4B7C-84C3-4D835187A6F0}" srcOrd="0" destOrd="0" presId="urn:microsoft.com/office/officeart/2005/8/layout/vList5"/>
     <dgm:cxn modelId="{69D83E30-638B-4C8B-87DC-600FE567AF85}" type="presOf" srcId="{BF95EC57-5936-4974-A783-8279AA2DE17D}" destId="{3513A661-E049-49A7-A84B-CDE58BC128C9}" srcOrd="0" destOrd="0" presId="urn:microsoft.com/office/officeart/2005/8/layout/vList5"/>
     <dgm:cxn modelId="{D29BA0D2-2C00-4F66-8163-3F03AB54F76E}" srcId="{235B55A1-85F2-46BD-B188-6F06F5D4A171}" destId="{6C742048-B828-4B29-B8E8-E763F092B0E9}" srcOrd="0" destOrd="0" parTransId="{0E56E70A-927A-4A3B-B350-6295B4A60749}" sibTransId="{781F592B-7330-4BDB-8722-F883830332DF}"/>
-    <dgm:cxn modelId="{FF28E987-B587-4624-B605-473B52E49CF5}" type="presOf" srcId="{2BD7B090-D898-4E65-9E50-1009FC591733}" destId="{FFAECC64-C87B-4241-8414-259FAB795432}" srcOrd="0" destOrd="1" presId="urn:microsoft.com/office/officeart/2005/8/layout/vList5"/>
+    <dgm:cxn modelId="{30D1160C-EB66-4DA7-AE15-72214F0845CF}" type="presOf" srcId="{26A77C95-5DF6-4719-ADEC-5EE891442978}" destId="{73351229-0CD8-43A8-A43A-2D3D9582E716}" srcOrd="0" destOrd="0" presId="urn:microsoft.com/office/officeart/2005/8/layout/vList5"/>
+    <dgm:cxn modelId="{AA919A95-63B0-4EF8-82C6-BAD6A90CB6E8}" srcId="{AC875E57-01B9-490D-8E7B-3E4AA2A39890}" destId="{26A77C95-5DF6-4719-ADEC-5EE891442978}" srcOrd="0" destOrd="0" parTransId="{DB61F0F5-7D89-4879-B027-6DF244927978}" sibTransId="{B352306E-8147-4D96-AA3C-C1E01E0A2831}"/>
     <dgm:cxn modelId="{1B340EE1-B887-4C4F-B0A1-68705024C313}" type="presOf" srcId="{6C742048-B828-4B29-B8E8-E763F092B0E9}" destId="{8888310B-D3F2-4AF4-921A-B66FB05564C1}" srcOrd="0" destOrd="0" presId="urn:microsoft.com/office/officeart/2005/8/layout/vList5"/>
-    <dgm:cxn modelId="{EF9C0B9D-45B2-4E1D-8DA7-6402EA473527}" srcId="{37BE8EAF-4D9C-45F0-ADFD-34D7679B5DCA}" destId="{2BD7B090-D898-4E65-9E50-1009FC591733}" srcOrd="1" destOrd="0" parTransId="{233E02C5-2B04-4FD8-8CA1-B56FF9259BC2}" sibTransId="{983D3244-10E0-4901-910E-F4D9B80B0F42}"/>
     <dgm:cxn modelId="{B59AE31E-4C11-482B-A4C5-F591A2AA8440}" srcId="{235B55A1-85F2-46BD-B188-6F06F5D4A171}" destId="{37BE8EAF-4D9C-45F0-ADFD-34D7679B5DCA}" srcOrd="1" destOrd="0" parTransId="{5F594A19-68DE-4937-BACF-333B59E5F50E}" sibTransId="{B6928DFE-C7BE-4838-A530-3C88A8919FF0}"/>
     <dgm:cxn modelId="{C80919B0-AE76-4217-B330-F71595F647F5}" srcId="{235B55A1-85F2-46BD-B188-6F06F5D4A171}" destId="{AC875E57-01B9-490D-8E7B-3E4AA2A39890}" srcOrd="3" destOrd="0" parTransId="{3FCB51C7-7057-4812-8576-53C0A98FEC27}" sibTransId="{70C75D3C-4979-4F88-9356-87250DEAA12F}"/>
-    <dgm:cxn modelId="{B69B0156-2165-47DD-A3B1-52DEAC8D90BC}" type="presOf" srcId="{61E8DC94-93CC-4EF5-890F-DC9F41836F92}" destId="{3513A661-E049-49A7-A84B-CDE58BC128C9}" srcOrd="0" destOrd="1" presId="urn:microsoft.com/office/officeart/2005/8/layout/vList5"/>
     <dgm:cxn modelId="{8BA434BB-916A-43A1-B380-93E273A8380A}" srcId="{97831BA3-5392-4C40-9746-6020D803C42A}" destId="{BF95EC57-5936-4974-A783-8279AA2DE17D}" srcOrd="0" destOrd="0" parTransId="{6BAA8F1A-69F8-4D5B-AA49-577C5721987B}" sibTransId="{084A6669-9820-475D-AA7C-BFD82C623498}"/>
     <dgm:cxn modelId="{1468A386-4043-422F-8CFA-1A0564937195}" type="presOf" srcId="{747FF608-217E-438B-BCFC-C198B0161C07}" destId="{B9328291-F94C-465E-BC05-BC968E4029C1}" srcOrd="0" destOrd="0" presId="urn:microsoft.com/office/officeart/2005/8/layout/vList5"/>
     <dgm:cxn modelId="{5707514A-2F67-40D1-819C-108179F9C566}" srcId="{6C742048-B828-4B29-B8E8-E763F092B0E9}" destId="{747FF608-217E-438B-BCFC-C198B0161C07}" srcOrd="0" destOrd="0" parTransId="{04B48E1E-054A-4C14-B28E-93E3BD7C4D3A}" sibTransId="{0FF173F9-2611-4C01-ACDF-5715C6BAD29A}"/>
@@ -1330,7 +1512,6 @@
     <dgm:cxn modelId="{34F6A223-7F87-4F5F-AC4F-FC5DFA2A104A}" srcId="{37BE8EAF-4D9C-45F0-ADFD-34D7679B5DCA}" destId="{AF6C5FEC-B06D-47E2-8FDA-7DEAC90858E5}" srcOrd="0" destOrd="0" parTransId="{70088A29-2B5C-49B0-A5FC-15A77A24724A}" sibTransId="{7AACAFFE-D56C-41EA-A721-8940BC06E628}"/>
     <dgm:cxn modelId="{B0A70232-3147-4FFD-AA52-C9C8FC36B77E}" type="presOf" srcId="{AC875E57-01B9-490D-8E7B-3E4AA2A39890}" destId="{8DCB7F05-B335-45AC-93EC-C3A5F5D6A7E0}" srcOrd="0" destOrd="0" presId="urn:microsoft.com/office/officeart/2005/8/layout/vList5"/>
     <dgm:cxn modelId="{114DE1B5-CA03-403B-A45C-110A9143BABC}" srcId="{235B55A1-85F2-46BD-B188-6F06F5D4A171}" destId="{97831BA3-5392-4C40-9746-6020D803C42A}" srcOrd="2" destOrd="0" parTransId="{0D8D7C03-2873-400C-8032-D645328CDBFE}" sibTransId="{412BF68C-0BEB-43D4-8253-EC1FD3D98463}"/>
-    <dgm:cxn modelId="{03B80E62-2126-4CB8-8FEE-594FD95CB979}" srcId="{97831BA3-5392-4C40-9746-6020D803C42A}" destId="{61E8DC94-93CC-4EF5-890F-DC9F41836F92}" srcOrd="1" destOrd="0" parTransId="{F79AC635-C281-40F1-8832-20978D84E1F7}" sibTransId="{6BD9B842-A648-45BF-958A-8C811AF7F73B}"/>
     <dgm:cxn modelId="{01518609-F9D6-46C9-8F6B-91241E2766B6}" type="presOf" srcId="{AF6C5FEC-B06D-47E2-8FDA-7DEAC90858E5}" destId="{FFAECC64-C87B-4241-8414-259FAB795432}" srcOrd="0" destOrd="0" presId="urn:microsoft.com/office/officeart/2005/8/layout/vList5"/>
     <dgm:cxn modelId="{419903BF-DB0D-4609-B8CC-1F44B96AEA86}" type="presOf" srcId="{235B55A1-85F2-46BD-B188-6F06F5D4A171}" destId="{8707C7F1-5F37-4BF1-9329-5EE09FFDF905}" srcOrd="0" destOrd="0" presId="urn:microsoft.com/office/officeart/2005/8/layout/vList5"/>
     <dgm:cxn modelId="{6B40CB67-857E-4B40-A659-8B8A5ECD8BB6}" type="presParOf" srcId="{8707C7F1-5F37-4BF1-9329-5EE09FFDF905}" destId="{A27B2C76-E53D-47E6-B83F-9542B00CEDBB}" srcOrd="0" destOrd="0" presId="urn:microsoft.com/office/officeart/2005/8/layout/vList5"/>
@@ -1347,6 +1528,7 @@
     <dgm:cxn modelId="{6860FD90-E416-4B4C-9326-B5DB16A6D4BA}" type="presParOf" srcId="{8707C7F1-5F37-4BF1-9329-5EE09FFDF905}" destId="{236287F9-664D-40B9-B2A2-8FAF5CC65211}" srcOrd="5" destOrd="0" presId="urn:microsoft.com/office/officeart/2005/8/layout/vList5"/>
     <dgm:cxn modelId="{54326626-0AC8-49C4-9EA8-FC64A626EB45}" type="presParOf" srcId="{8707C7F1-5F37-4BF1-9329-5EE09FFDF905}" destId="{1597A6FE-FBE5-4A6F-9621-E10D88B0D576}" srcOrd="6" destOrd="0" presId="urn:microsoft.com/office/officeart/2005/8/layout/vList5"/>
     <dgm:cxn modelId="{02AF0A23-307E-4469-B1DE-44646186B352}" type="presParOf" srcId="{1597A6FE-FBE5-4A6F-9621-E10D88B0D576}" destId="{8DCB7F05-B335-45AC-93EC-C3A5F5D6A7E0}" srcOrd="0" destOrd="0" presId="urn:microsoft.com/office/officeart/2005/8/layout/vList5"/>
+    <dgm:cxn modelId="{5A18D983-D300-4497-96DB-46262FAAFBFF}" type="presParOf" srcId="{1597A6FE-FBE5-4A6F-9621-E10D88B0D576}" destId="{73351229-0CD8-43A8-A43A-2D3D9582E716}" srcOrd="1" destOrd="0" presId="urn:microsoft.com/office/officeart/2005/8/layout/vList5"/>
   </dgm:cxnLst>
   <dgm:bg/>
   <dgm:whole/>
@@ -2786,7 +2968,7 @@
             <a:fld id="{8BA93F81-AB1A-49EB-B45D-4C43C205A3D4}" type="datetimeFigureOut">
               <a:rPr lang="it-IT" smtClean="0"/>
               <a:pPr/>
-              <a:t>25/09/2008</a:t>
+              <a:t>26/09/2008</a:t>
             </a:fld>
             <a:endParaRPr lang="it-IT"/>
           </a:p>
@@ -7668,16 +7850,14 @@
           </a:prstGeom>
         </p:spPr>
         <p:style>
-          <a:lnRef idx="2">
-            <a:schemeClr val="accent1">
-              <a:shade val="50000"/>
-            </a:schemeClr>
+          <a:lnRef idx="0">
+            <a:schemeClr val="accent5"/>
           </a:lnRef>
-          <a:fillRef idx="1">
-            <a:schemeClr val="accent1"/>
+          <a:fillRef idx="3">
+            <a:schemeClr val="accent5"/>
           </a:fillRef>
-          <a:effectRef idx="0">
-            <a:schemeClr val="accent1"/>
+          <a:effectRef idx="3">
+            <a:schemeClr val="accent5"/>
           </a:effectRef>
           <a:fontRef idx="minor">
             <a:schemeClr val="lt1"/>
@@ -8674,30 +8854,38 @@
           <a:lstStyle/>
           <a:p>
             <a:r>
-              <a:rPr lang="en-US" sz="3600" dirty="0" err="1" smtClean="0"/>
+              <a:rPr lang="en-US" sz="3000" dirty="0" err="1" smtClean="0"/>
               <a:t>Complessit</a:t>
             </a:r>
             <a:r>
-              <a:rPr lang="it-IT" sz="3600" dirty="0" smtClean="0"/>
+              <a:rPr lang="it-IT" sz="3000" dirty="0" smtClean="0"/>
               <a:t>à</a:t>
             </a:r>
             <a:r>
-              <a:rPr lang="en-US" sz="3600" dirty="0" smtClean="0"/>
+              <a:rPr lang="en-US" sz="3000" dirty="0" smtClean="0"/>
               <a:t> </a:t>
             </a:r>
             <a:r>
-              <a:rPr lang="en-US" sz="3600" dirty="0" err="1" smtClean="0"/>
+              <a:rPr lang="en-US" sz="3000" dirty="0" err="1" smtClean="0"/>
               <a:t>delle</a:t>
             </a:r>
             <a:r>
-              <a:rPr lang="en-US" sz="3600" dirty="0" smtClean="0"/>
+              <a:rPr lang="en-US" sz="3000" dirty="0" smtClean="0"/>
               <a:t> </a:t>
             </a:r>
             <a:r>
-              <a:rPr lang="en-US" sz="3600" dirty="0" err="1" smtClean="0"/>
+              <a:rPr lang="en-US" sz="3000" dirty="0" err="1" smtClean="0"/>
               <a:t>configurazioni</a:t>
             </a:r>
-            <a:endParaRPr lang="it-IT" sz="3600" dirty="0"/>
+            <a:r>
+              <a:rPr lang="en-US" sz="3000" dirty="0" smtClean="0"/>
+              <a:t> </a:t>
+            </a:r>
+            <a:r>
+              <a:rPr lang="en-US" sz="3000" dirty="0" err="1" smtClean="0"/>
+              <a:t>avanzate</a:t>
+            </a:r>
+            <a:endParaRPr lang="it-IT" sz="3000" dirty="0"/>
           </a:p>
         </p:txBody>
       </p:sp>
@@ -12426,6 +12614,26 @@
           </a:bodyPr>
           <a:lstStyle/>
           <a:p>
+            <a:r>
+              <a:rPr lang="en-US" sz="3600" dirty="0" err="1" smtClean="0"/>
+              <a:t>Ambienti</a:t>
+            </a:r>
+            <a:r>
+              <a:rPr lang="en-US" sz="3600" dirty="0" smtClean="0"/>
+              <a:t> </a:t>
+            </a:r>
+            <a:r>
+              <a:rPr lang="en-US" sz="3600" dirty="0" err="1" smtClean="0"/>
+              <a:t>di</a:t>
+            </a:r>
+            <a:r>
+              <a:rPr lang="en-US" sz="3600" dirty="0" smtClean="0"/>
+              <a:t> </a:t>
+            </a:r>
+            <a:r>
+              <a:rPr lang="en-US" sz="3600" dirty="0" err="1" smtClean="0"/>
+              <a:t>configurazione</a:t>
+            </a:r>
             <a:endParaRPr lang="it-IT" sz="3600" dirty="0"/>
           </a:p>
         </p:txBody>
@@ -12437,8 +12645,8 @@
           <p:nvPr/>
         </p:nvGraphicFramePr>
         <p:xfrm>
-          <a:off x="1524000" y="1397000"/>
-          <a:ext cx="6096000" cy="4460892"/>
+          <a:off x="214282" y="785794"/>
+          <a:ext cx="8715436" cy="5500726"/>
         </p:xfrm>
         <a:graphic>
           <a:graphicData uri="http://schemas.openxmlformats.org/drawingml/2006/diagram">
@@ -12553,30 +12761,1559 @@
       </p:sp>
       <p:sp>
         <p:nvSpPr>
-          <p:cNvPr id="9" name="Titolo 3"/>
-          <p:cNvSpPr>
-            <a:spLocks noGrp="1"/>
-          </p:cNvSpPr>
-          <p:nvPr>
-            <p:ph type="ctrTitle"/>
-          </p:nvPr>
+          <p:cNvPr id="10" name="Rettangolo arrotondato 9"/>
+          <p:cNvSpPr/>
+          <p:nvPr/>
         </p:nvSpPr>
         <p:spPr>
           <a:xfrm>
-            <a:off x="2321671" y="0"/>
-            <a:ext cx="6822329" cy="742954"/>
+            <a:off x="2428860" y="142852"/>
+            <a:ext cx="4071966" cy="1285884"/>
           </a:xfrm>
+          <a:prstGeom prst="roundRect">
+            <a:avLst/>
+          </a:prstGeom>
         </p:spPr>
+        <p:style>
+          <a:lnRef idx="1">
+            <a:schemeClr val="accent5"/>
+          </a:lnRef>
+          <a:fillRef idx="2">
+            <a:schemeClr val="accent5"/>
+          </a:fillRef>
+          <a:effectRef idx="1">
+            <a:schemeClr val="accent5"/>
+          </a:effectRef>
+          <a:fontRef idx="minor">
+            <a:schemeClr val="dk1"/>
+          </a:fontRef>
+        </p:style>
         <p:txBody>
-          <a:bodyPr>
-            <a:noAutofit/>
-          </a:bodyPr>
+          <a:bodyPr rtlCol="0" anchor="t" anchorCtr="0"/>
           <a:lstStyle/>
           <a:p>
-            <a:endParaRPr lang="it-IT" sz="3600" dirty="0"/>
+            <a:r>
+              <a:rPr lang="en-US" sz="2400" b="1" dirty="0" smtClean="0"/>
+              <a:t>GUI</a:t>
+            </a:r>
+            <a:endParaRPr lang="it-IT" b="1" dirty="0"/>
           </a:p>
         </p:txBody>
       </p:sp>
+      <p:sp>
+        <p:nvSpPr>
+          <p:cNvPr id="11" name="Ritaglia angolo stesso lato rettangolo 10"/>
+          <p:cNvSpPr/>
+          <p:nvPr/>
+        </p:nvSpPr>
+        <p:spPr>
+          <a:xfrm>
+            <a:off x="2643174" y="642918"/>
+            <a:ext cx="1143008" cy="642942"/>
+          </a:xfrm>
+          <a:prstGeom prst="snip2SameRect">
+            <a:avLst/>
+          </a:prstGeom>
+        </p:spPr>
+        <p:style>
+          <a:lnRef idx="0">
+            <a:schemeClr val="accent3"/>
+          </a:lnRef>
+          <a:fillRef idx="3">
+            <a:schemeClr val="accent3"/>
+          </a:fillRef>
+          <a:effectRef idx="3">
+            <a:schemeClr val="accent3"/>
+          </a:effectRef>
+          <a:fontRef idx="minor">
+            <a:schemeClr val="lt1"/>
+          </a:fontRef>
+        </p:style>
+        <p:txBody>
+          <a:bodyPr rtlCol="0" anchor="ctr"/>
+          <a:lstStyle/>
+          <a:p>
+            <a:pPr algn="ctr"/>
+            <a:r>
+              <a:rPr lang="en-US" b="1" dirty="0" smtClean="0">
+                <a:solidFill>
+                  <a:schemeClr val="tx1"/>
+                </a:solidFill>
+              </a:rPr>
+              <a:t>Property Editor</a:t>
+            </a:r>
+            <a:endParaRPr lang="it-IT" b="1" dirty="0">
+              <a:solidFill>
+                <a:schemeClr val="tx1"/>
+              </a:solidFill>
+            </a:endParaRPr>
+          </a:p>
+        </p:txBody>
+      </p:sp>
+      <p:sp>
+        <p:nvSpPr>
+          <p:cNvPr id="20" name="Rettangolo arrotondato 19"/>
+          <p:cNvSpPr/>
+          <p:nvPr/>
+        </p:nvSpPr>
+        <p:spPr>
+          <a:xfrm>
+            <a:off x="4572000" y="285728"/>
+            <a:ext cx="2428892" cy="1000132"/>
+          </a:xfrm>
+          <a:prstGeom prst="roundRect">
+            <a:avLst/>
+          </a:prstGeom>
+        </p:spPr>
+        <p:style>
+          <a:lnRef idx="0">
+            <a:schemeClr val="accent5"/>
+          </a:lnRef>
+          <a:fillRef idx="3">
+            <a:schemeClr val="accent5"/>
+          </a:fillRef>
+          <a:effectRef idx="3">
+            <a:schemeClr val="accent5"/>
+          </a:effectRef>
+          <a:fontRef idx="minor">
+            <a:schemeClr val="lt1"/>
+          </a:fontRef>
+        </p:style>
+        <p:txBody>
+          <a:bodyPr rtlCol="0" anchor="b" anchorCtr="0"/>
+          <a:lstStyle/>
+          <a:p>
+            <a:pPr algn="ctr"/>
+            <a:r>
+              <a:rPr lang="en-US" b="1" dirty="0" smtClean="0">
+                <a:solidFill>
+                  <a:schemeClr val="bg1"/>
+                </a:solidFill>
+              </a:rPr>
+              <a:t>Graph Scene</a:t>
+            </a:r>
+            <a:endParaRPr lang="it-IT" b="1" dirty="0">
+              <a:solidFill>
+                <a:schemeClr val="bg1"/>
+              </a:solidFill>
+            </a:endParaRPr>
+          </a:p>
+        </p:txBody>
+      </p:sp>
+      <p:sp>
+        <p:nvSpPr>
+          <p:cNvPr id="13" name="Rettangolo arrotondato 12"/>
+          <p:cNvSpPr/>
+          <p:nvPr/>
+        </p:nvSpPr>
+        <p:spPr>
+          <a:xfrm>
+            <a:off x="4714876" y="428604"/>
+            <a:ext cx="2143140" cy="428628"/>
+          </a:xfrm>
+          <a:prstGeom prst="roundRect">
+            <a:avLst/>
+          </a:prstGeom>
+        </p:spPr>
+        <p:style>
+          <a:lnRef idx="0">
+            <a:schemeClr val="accent3"/>
+          </a:lnRef>
+          <a:fillRef idx="3">
+            <a:schemeClr val="accent3"/>
+          </a:fillRef>
+          <a:effectRef idx="3">
+            <a:schemeClr val="accent3"/>
+          </a:effectRef>
+          <a:fontRef idx="minor">
+            <a:schemeClr val="lt1"/>
+          </a:fontRef>
+        </p:style>
+        <p:txBody>
+          <a:bodyPr rtlCol="0" anchor="ctr"/>
+          <a:lstStyle/>
+          <a:p>
+            <a:pPr algn="ctr"/>
+            <a:r>
+              <a:rPr lang="en-US" b="1" dirty="0" err="1" smtClean="0">
+                <a:solidFill>
+                  <a:schemeClr val="tx1"/>
+                </a:solidFill>
+              </a:rPr>
+              <a:t>Graphisc</a:t>
+            </a:r>
+            <a:r>
+              <a:rPr lang="en-US" b="1" dirty="0" smtClean="0">
+                <a:solidFill>
+                  <a:schemeClr val="tx1"/>
+                </a:solidFill>
+              </a:rPr>
+              <a:t> Items</a:t>
+            </a:r>
+            <a:endParaRPr lang="it-IT" b="1" dirty="0">
+              <a:solidFill>
+                <a:schemeClr val="tx1"/>
+              </a:solidFill>
+            </a:endParaRPr>
+          </a:p>
+        </p:txBody>
+      </p:sp>
+      <p:sp>
+        <p:nvSpPr>
+          <p:cNvPr id="14" name="Rettangolo arrotondato 13"/>
+          <p:cNvSpPr/>
+          <p:nvPr/>
+        </p:nvSpPr>
+        <p:spPr>
+          <a:xfrm>
+            <a:off x="5143504" y="1643050"/>
+            <a:ext cx="1285884" cy="642942"/>
+          </a:xfrm>
+          <a:prstGeom prst="roundRect">
+            <a:avLst/>
+          </a:prstGeom>
+        </p:spPr>
+        <p:style>
+          <a:lnRef idx="0">
+            <a:schemeClr val="accent1"/>
+          </a:lnRef>
+          <a:fillRef idx="3">
+            <a:schemeClr val="accent1"/>
+          </a:fillRef>
+          <a:effectRef idx="3">
+            <a:schemeClr val="accent1"/>
+          </a:effectRef>
+          <a:fontRef idx="minor">
+            <a:schemeClr val="lt1"/>
+          </a:fontRef>
+        </p:style>
+        <p:txBody>
+          <a:bodyPr rtlCol="0" anchor="ctr"/>
+          <a:lstStyle/>
+          <a:p>
+            <a:pPr algn="ctr"/>
+            <a:r>
+              <a:rPr lang="en-US" b="1" dirty="0" smtClean="0">
+                <a:solidFill>
+                  <a:schemeClr val="bg1"/>
+                </a:solidFill>
+              </a:rPr>
+              <a:t>Graph Scene</a:t>
+            </a:r>
+            <a:endParaRPr lang="it-IT" b="1" dirty="0">
+              <a:solidFill>
+                <a:schemeClr val="bg1"/>
+              </a:solidFill>
+            </a:endParaRPr>
+          </a:p>
+        </p:txBody>
+      </p:sp>
+      <p:sp>
+        <p:nvSpPr>
+          <p:cNvPr id="15" name="Rettangolo arrotondato 14"/>
+          <p:cNvSpPr/>
+          <p:nvPr/>
+        </p:nvSpPr>
+        <p:spPr>
+          <a:xfrm>
+            <a:off x="4572000" y="2643182"/>
+            <a:ext cx="2428892" cy="357190"/>
+          </a:xfrm>
+          <a:prstGeom prst="roundRect">
+            <a:avLst/>
+          </a:prstGeom>
+        </p:spPr>
+        <p:style>
+          <a:lnRef idx="1">
+            <a:schemeClr val="accent4"/>
+          </a:lnRef>
+          <a:fillRef idx="2">
+            <a:schemeClr val="accent4"/>
+          </a:fillRef>
+          <a:effectRef idx="1">
+            <a:schemeClr val="accent4"/>
+          </a:effectRef>
+          <a:fontRef idx="minor">
+            <a:schemeClr val="dk1"/>
+          </a:fontRef>
+        </p:style>
+        <p:txBody>
+          <a:bodyPr rtlCol="0" anchor="ctr"/>
+          <a:lstStyle/>
+          <a:p>
+            <a:pPr algn="ctr"/>
+            <a:r>
+              <a:rPr lang="en-US" b="1" dirty="0" smtClean="0"/>
+              <a:t>Handlers</a:t>
+            </a:r>
+            <a:endParaRPr lang="it-IT" b="1" dirty="0"/>
+          </a:p>
+        </p:txBody>
+      </p:sp>
+      <p:sp>
+        <p:nvSpPr>
+          <p:cNvPr id="16" name="Rettangolo 15"/>
+          <p:cNvSpPr/>
+          <p:nvPr/>
+        </p:nvSpPr>
+        <p:spPr>
+          <a:xfrm>
+            <a:off x="5357818" y="3286124"/>
+            <a:ext cx="1643074" cy="500066"/>
+          </a:xfrm>
+          <a:prstGeom prst="rect">
+            <a:avLst/>
+          </a:prstGeom>
+        </p:spPr>
+        <p:style>
+          <a:lnRef idx="1">
+            <a:schemeClr val="accent2"/>
+          </a:lnRef>
+          <a:fillRef idx="2">
+            <a:schemeClr val="accent2"/>
+          </a:fillRef>
+          <a:effectRef idx="1">
+            <a:schemeClr val="accent2"/>
+          </a:effectRef>
+          <a:fontRef idx="minor">
+            <a:schemeClr val="dk1"/>
+          </a:fontRef>
+        </p:style>
+        <p:txBody>
+          <a:bodyPr rtlCol="0" anchor="ctr"/>
+          <a:lstStyle/>
+          <a:p>
+            <a:pPr algn="ctr"/>
+            <a:r>
+              <a:rPr lang="en-US" b="1" dirty="0" smtClean="0"/>
+              <a:t>Redo/Undo Framework</a:t>
+            </a:r>
+            <a:endParaRPr lang="it-IT" b="1" dirty="0"/>
+          </a:p>
+        </p:txBody>
+      </p:sp>
+      <p:sp>
+        <p:nvSpPr>
+          <p:cNvPr id="17" name="Rettangolo arrotondato 16"/>
+          <p:cNvSpPr/>
+          <p:nvPr/>
+        </p:nvSpPr>
+        <p:spPr>
+          <a:xfrm>
+            <a:off x="2643174" y="4286256"/>
+            <a:ext cx="4357718" cy="357190"/>
+          </a:xfrm>
+          <a:prstGeom prst="roundRect">
+            <a:avLst/>
+          </a:prstGeom>
+        </p:spPr>
+        <p:style>
+          <a:lnRef idx="1">
+            <a:schemeClr val="accent4"/>
+          </a:lnRef>
+          <a:fillRef idx="2">
+            <a:schemeClr val="accent4"/>
+          </a:fillRef>
+          <a:effectRef idx="1">
+            <a:schemeClr val="accent4"/>
+          </a:effectRef>
+          <a:fontRef idx="minor">
+            <a:schemeClr val="dk1"/>
+          </a:fontRef>
+        </p:style>
+        <p:txBody>
+          <a:bodyPr rtlCol="0" anchor="ctr"/>
+          <a:lstStyle/>
+          <a:p>
+            <a:pPr algn="ctr"/>
+            <a:r>
+              <a:rPr lang="en-US" b="1" dirty="0" smtClean="0"/>
+              <a:t>Facade Controllers</a:t>
+            </a:r>
+            <a:endParaRPr lang="it-IT" b="1" dirty="0"/>
+          </a:p>
+        </p:txBody>
+      </p:sp>
+      <p:sp>
+        <p:nvSpPr>
+          <p:cNvPr id="19" name="Rettangolo arrotondato 18"/>
+          <p:cNvSpPr/>
+          <p:nvPr/>
+        </p:nvSpPr>
+        <p:spPr>
+          <a:xfrm>
+            <a:off x="2643174" y="5000636"/>
+            <a:ext cx="4357718" cy="571504"/>
+          </a:xfrm>
+          <a:prstGeom prst="roundRect">
+            <a:avLst/>
+          </a:prstGeom>
+        </p:spPr>
+        <p:style>
+          <a:lnRef idx="1">
+            <a:schemeClr val="accent5"/>
+          </a:lnRef>
+          <a:fillRef idx="2">
+            <a:schemeClr val="accent5"/>
+          </a:fillRef>
+          <a:effectRef idx="1">
+            <a:schemeClr val="accent5"/>
+          </a:effectRef>
+          <a:fontRef idx="minor">
+            <a:schemeClr val="dk1"/>
+          </a:fontRef>
+        </p:style>
+        <p:txBody>
+          <a:bodyPr rtlCol="0" anchor="ctr" anchorCtr="0"/>
+          <a:lstStyle/>
+          <a:p>
+            <a:pPr algn="ctr"/>
+            <a:r>
+              <a:rPr lang="en-US" sz="2400" b="1" dirty="0" smtClean="0"/>
+              <a:t>CORE</a:t>
+            </a:r>
+            <a:endParaRPr lang="it-IT" b="1" dirty="0"/>
+          </a:p>
+        </p:txBody>
+      </p:sp>
+      <p:sp>
+        <p:nvSpPr>
+          <p:cNvPr id="21" name="Rettangolo arrotondato 20"/>
+          <p:cNvSpPr/>
+          <p:nvPr/>
+        </p:nvSpPr>
+        <p:spPr>
+          <a:xfrm>
+            <a:off x="2643174" y="5715016"/>
+            <a:ext cx="4357718" cy="500066"/>
+          </a:xfrm>
+          <a:prstGeom prst="roundRect">
+            <a:avLst/>
+          </a:prstGeom>
+        </p:spPr>
+        <p:style>
+          <a:lnRef idx="1">
+            <a:schemeClr val="dk1"/>
+          </a:lnRef>
+          <a:fillRef idx="2">
+            <a:schemeClr val="dk1"/>
+          </a:fillRef>
+          <a:effectRef idx="1">
+            <a:schemeClr val="dk1"/>
+          </a:effectRef>
+          <a:fontRef idx="minor">
+            <a:schemeClr val="dk1"/>
+          </a:fontRef>
+        </p:style>
+        <p:txBody>
+          <a:bodyPr rtlCol="0" anchor="ctr"/>
+          <a:lstStyle/>
+          <a:p>
+            <a:pPr algn="ctr"/>
+            <a:r>
+              <a:rPr lang="en-US" b="1" dirty="0" err="1" smtClean="0"/>
+              <a:t>Persistance</a:t>
+            </a:r>
+            <a:endParaRPr lang="it-IT" b="1" dirty="0"/>
+          </a:p>
+        </p:txBody>
+      </p:sp>
+      <p:sp>
+        <p:nvSpPr>
+          <p:cNvPr id="22" name="Disco magnetico 21"/>
+          <p:cNvSpPr/>
+          <p:nvPr/>
+        </p:nvSpPr>
+        <p:spPr>
+          <a:xfrm>
+            <a:off x="7643834" y="5286388"/>
+            <a:ext cx="928694" cy="1000132"/>
+          </a:xfrm>
+          <a:prstGeom prst="flowChartMagneticDisk">
+            <a:avLst/>
+          </a:prstGeom>
+        </p:spPr>
+        <p:style>
+          <a:lnRef idx="1">
+            <a:schemeClr val="dk1"/>
+          </a:lnRef>
+          <a:fillRef idx="2">
+            <a:schemeClr val="dk1"/>
+          </a:fillRef>
+          <a:effectRef idx="1">
+            <a:schemeClr val="dk1"/>
+          </a:effectRef>
+          <a:fontRef idx="minor">
+            <a:schemeClr val="dk1"/>
+          </a:fontRef>
+        </p:style>
+        <p:txBody>
+          <a:bodyPr rtlCol="0" anchor="ctr"/>
+          <a:lstStyle/>
+          <a:p>
+            <a:pPr algn="ctr"/>
+            <a:r>
+              <a:rPr lang="en-US" b="1" dirty="0" smtClean="0"/>
+              <a:t>File</a:t>
+            </a:r>
+          </a:p>
+          <a:p>
+            <a:pPr algn="ctr"/>
+            <a:r>
+              <a:rPr lang="en-US" b="1" dirty="0" smtClean="0"/>
+              <a:t>System</a:t>
+            </a:r>
+            <a:endParaRPr lang="it-IT" b="1" dirty="0"/>
+          </a:p>
+        </p:txBody>
+      </p:sp>
+      <p:sp>
+        <p:nvSpPr>
+          <p:cNvPr id="24" name="Rettangolo arrotondato 23"/>
+          <p:cNvSpPr/>
+          <p:nvPr/>
+        </p:nvSpPr>
+        <p:spPr>
+          <a:xfrm>
+            <a:off x="7358082" y="1000108"/>
+            <a:ext cx="642942" cy="4000528"/>
+          </a:xfrm>
+          <a:prstGeom prst="roundRect">
+            <a:avLst/>
+          </a:prstGeom>
+        </p:spPr>
+        <p:style>
+          <a:lnRef idx="1">
+            <a:schemeClr val="accent4"/>
+          </a:lnRef>
+          <a:fillRef idx="2">
+            <a:schemeClr val="accent4"/>
+          </a:fillRef>
+          <a:effectRef idx="1">
+            <a:schemeClr val="accent4"/>
+          </a:effectRef>
+          <a:fontRef idx="minor">
+            <a:schemeClr val="dk1"/>
+          </a:fontRef>
+        </p:style>
+        <p:txBody>
+          <a:bodyPr vert="wordArtVert" rtlCol="0" anchor="ctr"/>
+          <a:lstStyle/>
+          <a:p>
+            <a:pPr algn="ctr"/>
+            <a:r>
+              <a:rPr lang="en-US" b="1" dirty="0" err="1" smtClean="0"/>
+              <a:t>Mappers</a:t>
+            </a:r>
+            <a:endParaRPr lang="it-IT" b="1" dirty="0"/>
+          </a:p>
+        </p:txBody>
+      </p:sp>
+      <p:cxnSp>
+        <p:nvCxnSpPr>
+          <p:cNvPr id="26" name="Connettore 2 25"/>
+          <p:cNvCxnSpPr>
+            <a:stCxn id="14" idx="0"/>
+            <a:endCxn id="20" idx="2"/>
+          </p:cNvCxnSpPr>
+          <p:nvPr/>
+        </p:nvCxnSpPr>
+        <p:spPr>
+          <a:xfrm rot="5400000" flipH="1" flipV="1">
+            <a:off x="5607851" y="1464455"/>
+            <a:ext cx="357190" cy="1588"/>
+          </a:xfrm>
+          <a:prstGeom prst="straightConnector1">
+            <a:avLst/>
+          </a:prstGeom>
+          <a:ln>
+            <a:tailEnd type="arrow"/>
+          </a:ln>
+        </p:spPr>
+        <p:style>
+          <a:lnRef idx="3">
+            <a:schemeClr val="dk1"/>
+          </a:lnRef>
+          <a:fillRef idx="0">
+            <a:schemeClr val="dk1"/>
+          </a:fillRef>
+          <a:effectRef idx="2">
+            <a:schemeClr val="dk1"/>
+          </a:effectRef>
+          <a:fontRef idx="minor">
+            <a:schemeClr val="tx1"/>
+          </a:fontRef>
+        </p:style>
+      </p:cxnSp>
+      <p:cxnSp>
+        <p:nvCxnSpPr>
+          <p:cNvPr id="28" name="Connettore 2 27"/>
+          <p:cNvCxnSpPr>
+            <a:stCxn id="14" idx="2"/>
+            <a:endCxn id="15" idx="0"/>
+          </p:cNvCxnSpPr>
+          <p:nvPr/>
+        </p:nvCxnSpPr>
+        <p:spPr>
+          <a:xfrm rot="5400000">
+            <a:off x="5607851" y="2464587"/>
+            <a:ext cx="357190" cy="1588"/>
+          </a:xfrm>
+          <a:prstGeom prst="straightConnector1">
+            <a:avLst/>
+          </a:prstGeom>
+          <a:ln>
+            <a:headEnd type="arrow"/>
+            <a:tailEnd type="arrow"/>
+          </a:ln>
+        </p:spPr>
+        <p:style>
+          <a:lnRef idx="2">
+            <a:schemeClr val="dk1"/>
+          </a:lnRef>
+          <a:fillRef idx="0">
+            <a:schemeClr val="dk1"/>
+          </a:fillRef>
+          <a:effectRef idx="1">
+            <a:schemeClr val="dk1"/>
+          </a:effectRef>
+          <a:fontRef idx="minor">
+            <a:schemeClr val="tx1"/>
+          </a:fontRef>
+        </p:style>
+      </p:cxnSp>
+      <p:cxnSp>
+        <p:nvCxnSpPr>
+          <p:cNvPr id="33" name="Connettore 2 32"/>
+          <p:cNvCxnSpPr>
+            <a:stCxn id="15" idx="2"/>
+          </p:cNvCxnSpPr>
+          <p:nvPr/>
+        </p:nvCxnSpPr>
+        <p:spPr>
+          <a:xfrm rot="5400000">
+            <a:off x="5643570" y="3143248"/>
+            <a:ext cx="285752" cy="1588"/>
+          </a:xfrm>
+          <a:prstGeom prst="straightConnector1">
+            <a:avLst/>
+          </a:prstGeom>
+          <a:ln>
+            <a:headEnd type="arrow"/>
+            <a:tailEnd type="arrow"/>
+          </a:ln>
+        </p:spPr>
+        <p:style>
+          <a:lnRef idx="2">
+            <a:schemeClr val="dk1"/>
+          </a:lnRef>
+          <a:fillRef idx="0">
+            <a:schemeClr val="dk1"/>
+          </a:fillRef>
+          <a:effectRef idx="1">
+            <a:schemeClr val="dk1"/>
+          </a:effectRef>
+          <a:fontRef idx="minor">
+            <a:schemeClr val="tx1"/>
+          </a:fontRef>
+        </p:style>
+      </p:cxnSp>
+      <p:cxnSp>
+        <p:nvCxnSpPr>
+          <p:cNvPr id="34" name="Connettore 2 33"/>
+          <p:cNvCxnSpPr/>
+          <p:nvPr/>
+        </p:nvCxnSpPr>
+        <p:spPr>
+          <a:xfrm rot="5400000">
+            <a:off x="5537207" y="4035429"/>
+            <a:ext cx="500066" cy="1588"/>
+          </a:xfrm>
+          <a:prstGeom prst="straightConnector1">
+            <a:avLst/>
+          </a:prstGeom>
+          <a:ln>
+            <a:headEnd type="arrow"/>
+            <a:tailEnd type="arrow"/>
+          </a:ln>
+        </p:spPr>
+        <p:style>
+          <a:lnRef idx="2">
+            <a:schemeClr val="dk1"/>
+          </a:lnRef>
+          <a:fillRef idx="0">
+            <a:schemeClr val="dk1"/>
+          </a:fillRef>
+          <a:effectRef idx="1">
+            <a:schemeClr val="dk1"/>
+          </a:effectRef>
+          <a:fontRef idx="minor">
+            <a:schemeClr val="tx1"/>
+          </a:fontRef>
+        </p:style>
+      </p:cxnSp>
+      <p:cxnSp>
+        <p:nvCxnSpPr>
+          <p:cNvPr id="36" name="Connettore 2 35"/>
+          <p:cNvCxnSpPr>
+            <a:stCxn id="17" idx="0"/>
+          </p:cNvCxnSpPr>
+          <p:nvPr/>
+        </p:nvCxnSpPr>
+        <p:spPr>
+          <a:xfrm rot="16200000" flipV="1">
+            <a:off x="4171149" y="3635371"/>
+            <a:ext cx="1297396" cy="4373"/>
+          </a:xfrm>
+          <a:prstGeom prst="straightConnector1">
+            <a:avLst/>
+          </a:prstGeom>
+          <a:ln>
+            <a:headEnd type="arrow"/>
+            <a:tailEnd type="arrow"/>
+          </a:ln>
+        </p:spPr>
+        <p:style>
+          <a:lnRef idx="3">
+            <a:schemeClr val="dk1"/>
+          </a:lnRef>
+          <a:fillRef idx="0">
+            <a:schemeClr val="dk1"/>
+          </a:fillRef>
+          <a:effectRef idx="2">
+            <a:schemeClr val="dk1"/>
+          </a:effectRef>
+          <a:fontRef idx="minor">
+            <a:schemeClr val="tx1"/>
+          </a:fontRef>
+        </p:style>
+      </p:cxnSp>
+      <p:cxnSp>
+        <p:nvCxnSpPr>
+          <p:cNvPr id="43" name="Connettore 4 42"/>
+          <p:cNvCxnSpPr>
+            <a:stCxn id="17" idx="1"/>
+            <a:endCxn id="21" idx="1"/>
+          </p:cNvCxnSpPr>
+          <p:nvPr/>
+        </p:nvCxnSpPr>
+        <p:spPr>
+          <a:xfrm rot="10800000" flipV="1">
+            <a:off x="2643174" y="4464851"/>
+            <a:ext cx="1588" cy="1500198"/>
+          </a:xfrm>
+          <a:prstGeom prst="bentConnector3">
+            <a:avLst>
+              <a:gd name="adj1" fmla="val 14395466"/>
+            </a:avLst>
+          </a:prstGeom>
+          <a:ln>
+            <a:headEnd type="arrow"/>
+            <a:tailEnd type="arrow"/>
+          </a:ln>
+        </p:spPr>
+        <p:style>
+          <a:lnRef idx="2">
+            <a:schemeClr val="dk1"/>
+          </a:lnRef>
+          <a:fillRef idx="0">
+            <a:schemeClr val="dk1"/>
+          </a:fillRef>
+          <a:effectRef idx="1">
+            <a:schemeClr val="dk1"/>
+          </a:effectRef>
+          <a:fontRef idx="minor">
+            <a:schemeClr val="tx1"/>
+          </a:fontRef>
+        </p:style>
+      </p:cxnSp>
+      <p:cxnSp>
+        <p:nvCxnSpPr>
+          <p:cNvPr id="45" name="Connettore 2 44"/>
+          <p:cNvCxnSpPr>
+            <a:stCxn id="17" idx="2"/>
+            <a:endCxn id="19" idx="0"/>
+          </p:cNvCxnSpPr>
+          <p:nvPr/>
+        </p:nvCxnSpPr>
+        <p:spPr>
+          <a:xfrm rot="5400000">
+            <a:off x="4643438" y="4822041"/>
+            <a:ext cx="357190" cy="1588"/>
+          </a:xfrm>
+          <a:prstGeom prst="straightConnector1">
+            <a:avLst/>
+          </a:prstGeom>
+          <a:ln>
+            <a:headEnd type="arrow"/>
+            <a:tailEnd type="arrow"/>
+          </a:ln>
+        </p:spPr>
+        <p:style>
+          <a:lnRef idx="2">
+            <a:schemeClr val="dk1"/>
+          </a:lnRef>
+          <a:fillRef idx="0">
+            <a:schemeClr val="dk1"/>
+          </a:fillRef>
+          <a:effectRef idx="1">
+            <a:schemeClr val="dk1"/>
+          </a:effectRef>
+          <a:fontRef idx="minor">
+            <a:schemeClr val="tx1"/>
+          </a:fontRef>
+        </p:style>
+      </p:cxnSp>
+      <p:cxnSp>
+        <p:nvCxnSpPr>
+          <p:cNvPr id="57" name="Connettore 2 56"/>
+          <p:cNvCxnSpPr/>
+          <p:nvPr/>
+        </p:nvCxnSpPr>
+        <p:spPr>
+          <a:xfrm rot="5400000" flipH="1" flipV="1">
+            <a:off x="4179091" y="2035959"/>
+            <a:ext cx="1214446" cy="1588"/>
+          </a:xfrm>
+          <a:prstGeom prst="straightConnector1">
+            <a:avLst/>
+          </a:prstGeom>
+          <a:ln>
+            <a:tailEnd type="arrow"/>
+          </a:ln>
+        </p:spPr>
+        <p:style>
+          <a:lnRef idx="3">
+            <a:schemeClr val="dk1"/>
+          </a:lnRef>
+          <a:fillRef idx="0">
+            <a:schemeClr val="dk1"/>
+          </a:fillRef>
+          <a:effectRef idx="2">
+            <a:schemeClr val="dk1"/>
+          </a:effectRef>
+          <a:fontRef idx="minor">
+            <a:schemeClr val="tx1"/>
+          </a:fontRef>
+        </p:style>
+      </p:cxnSp>
+      <p:cxnSp>
+        <p:nvCxnSpPr>
+          <p:cNvPr id="59" name="Connettore 2 58"/>
+          <p:cNvCxnSpPr>
+            <a:stCxn id="15" idx="3"/>
+          </p:cNvCxnSpPr>
+          <p:nvPr/>
+        </p:nvCxnSpPr>
+        <p:spPr>
+          <a:xfrm flipV="1">
+            <a:off x="7000892" y="2428868"/>
+            <a:ext cx="357190" cy="392909"/>
+          </a:xfrm>
+          <a:prstGeom prst="straightConnector1">
+            <a:avLst/>
+          </a:prstGeom>
+          <a:ln>
+            <a:headEnd type="arrow"/>
+            <a:tailEnd type="arrow"/>
+          </a:ln>
+        </p:spPr>
+        <p:style>
+          <a:lnRef idx="2">
+            <a:schemeClr val="dk1"/>
+          </a:lnRef>
+          <a:fillRef idx="0">
+            <a:schemeClr val="dk1"/>
+          </a:fillRef>
+          <a:effectRef idx="1">
+            <a:schemeClr val="dk1"/>
+          </a:effectRef>
+          <a:fontRef idx="minor">
+            <a:schemeClr val="tx1"/>
+          </a:fontRef>
+        </p:style>
+      </p:cxnSp>
+      <p:cxnSp>
+        <p:nvCxnSpPr>
+          <p:cNvPr id="62" name="Connettore 2 61"/>
+          <p:cNvCxnSpPr>
+            <a:stCxn id="17" idx="3"/>
+          </p:cNvCxnSpPr>
+          <p:nvPr/>
+        </p:nvCxnSpPr>
+        <p:spPr>
+          <a:xfrm flipV="1">
+            <a:off x="7000892" y="4000504"/>
+            <a:ext cx="357190" cy="464347"/>
+          </a:xfrm>
+          <a:prstGeom prst="straightConnector1">
+            <a:avLst/>
+          </a:prstGeom>
+          <a:ln>
+            <a:headEnd type="arrow"/>
+            <a:tailEnd type="arrow"/>
+          </a:ln>
+        </p:spPr>
+        <p:style>
+          <a:lnRef idx="2">
+            <a:schemeClr val="dk1"/>
+          </a:lnRef>
+          <a:fillRef idx="0">
+            <a:schemeClr val="dk1"/>
+          </a:fillRef>
+          <a:effectRef idx="1">
+            <a:schemeClr val="dk1"/>
+          </a:effectRef>
+          <a:fontRef idx="minor">
+            <a:schemeClr val="tx1"/>
+          </a:fontRef>
+        </p:style>
+      </p:cxnSp>
+      <p:cxnSp>
+        <p:nvCxnSpPr>
+          <p:cNvPr id="65" name="Connettore 2 64"/>
+          <p:cNvCxnSpPr>
+            <a:endCxn id="19" idx="3"/>
+          </p:cNvCxnSpPr>
+          <p:nvPr/>
+        </p:nvCxnSpPr>
+        <p:spPr>
+          <a:xfrm rot="5400000">
+            <a:off x="6893735" y="4822041"/>
+            <a:ext cx="571504" cy="357190"/>
+          </a:xfrm>
+          <a:prstGeom prst="straightConnector1">
+            <a:avLst/>
+          </a:prstGeom>
+          <a:ln>
+            <a:prstDash val="dash"/>
+            <a:tailEnd type="arrow"/>
+          </a:ln>
+        </p:spPr>
+        <p:style>
+          <a:lnRef idx="2">
+            <a:schemeClr val="dk1"/>
+          </a:lnRef>
+          <a:fillRef idx="0">
+            <a:schemeClr val="dk1"/>
+          </a:fillRef>
+          <a:effectRef idx="1">
+            <a:schemeClr val="dk1"/>
+          </a:effectRef>
+          <a:fontRef idx="minor">
+            <a:schemeClr val="tx1"/>
+          </a:fontRef>
+        </p:style>
+      </p:cxnSp>
+      <p:cxnSp>
+        <p:nvCxnSpPr>
+          <p:cNvPr id="66" name="Connettore 2 65"/>
+          <p:cNvCxnSpPr>
+            <a:endCxn id="13" idx="3"/>
+          </p:cNvCxnSpPr>
+          <p:nvPr/>
+        </p:nvCxnSpPr>
+        <p:spPr>
+          <a:xfrm rot="16200000" flipV="1">
+            <a:off x="6715140" y="785794"/>
+            <a:ext cx="785818" cy="500066"/>
+          </a:xfrm>
+          <a:prstGeom prst="straightConnector1">
+            <a:avLst/>
+          </a:prstGeom>
+          <a:ln>
+            <a:prstDash val="dash"/>
+            <a:tailEnd type="arrow"/>
+          </a:ln>
+        </p:spPr>
+        <p:style>
+          <a:lnRef idx="2">
+            <a:schemeClr val="dk1"/>
+          </a:lnRef>
+          <a:fillRef idx="0">
+            <a:schemeClr val="dk1"/>
+          </a:fillRef>
+          <a:effectRef idx="1">
+            <a:schemeClr val="dk1"/>
+          </a:effectRef>
+          <a:fontRef idx="minor">
+            <a:schemeClr val="tx1"/>
+          </a:fontRef>
+        </p:style>
+      </p:cxnSp>
+      <p:cxnSp>
+        <p:nvCxnSpPr>
+          <p:cNvPr id="70" name="Connettore 2 69"/>
+          <p:cNvCxnSpPr>
+            <a:stCxn id="21" idx="3"/>
+          </p:cNvCxnSpPr>
+          <p:nvPr/>
+        </p:nvCxnSpPr>
+        <p:spPr>
+          <a:xfrm flipV="1">
+            <a:off x="7000892" y="5964072"/>
+            <a:ext cx="669150" cy="977"/>
+          </a:xfrm>
+          <a:prstGeom prst="straightConnector1">
+            <a:avLst/>
+          </a:prstGeom>
+          <a:ln>
+            <a:headEnd type="arrow"/>
+            <a:tailEnd type="arrow"/>
+          </a:ln>
+        </p:spPr>
+        <p:style>
+          <a:lnRef idx="2">
+            <a:schemeClr val="dk1"/>
+          </a:lnRef>
+          <a:fillRef idx="0">
+            <a:schemeClr val="dk1"/>
+          </a:fillRef>
+          <a:effectRef idx="1">
+            <a:schemeClr val="dk1"/>
+          </a:effectRef>
+          <a:fontRef idx="minor">
+            <a:schemeClr val="tx1"/>
+          </a:fontRef>
+        </p:style>
+      </p:cxnSp>
+      <p:sp>
+        <p:nvSpPr>
+          <p:cNvPr id="73" name="Rettangolo arrotondato 72"/>
+          <p:cNvSpPr/>
+          <p:nvPr/>
+        </p:nvSpPr>
+        <p:spPr>
+          <a:xfrm>
+            <a:off x="2357422" y="3071810"/>
+            <a:ext cx="1714512" cy="714380"/>
+          </a:xfrm>
+          <a:prstGeom prst="roundRect">
+            <a:avLst/>
+          </a:prstGeom>
+        </p:spPr>
+        <p:style>
+          <a:lnRef idx="1">
+            <a:schemeClr val="accent4"/>
+          </a:lnRef>
+          <a:fillRef idx="2">
+            <a:schemeClr val="accent4"/>
+          </a:fillRef>
+          <a:effectRef idx="1">
+            <a:schemeClr val="accent4"/>
+          </a:effectRef>
+          <a:fontRef idx="minor">
+            <a:schemeClr val="dk1"/>
+          </a:fontRef>
+        </p:style>
+        <p:txBody>
+          <a:bodyPr rtlCol="0" anchor="ctr"/>
+          <a:lstStyle/>
+          <a:p>
+            <a:pPr algn="ctr"/>
+            <a:r>
+              <a:rPr lang="en-US" b="1" dirty="0" smtClean="0"/>
+              <a:t>Property </a:t>
+            </a:r>
+            <a:r>
+              <a:rPr lang="en-US" b="1" dirty="0" err="1" smtClean="0"/>
+              <a:t>Controlers</a:t>
+            </a:r>
+            <a:endParaRPr lang="it-IT" b="1" dirty="0"/>
+          </a:p>
+        </p:txBody>
+      </p:sp>
+      <p:sp>
+        <p:nvSpPr>
+          <p:cNvPr id="74" name="Rettangolo arrotondato 73"/>
+          <p:cNvSpPr/>
+          <p:nvPr/>
+        </p:nvSpPr>
+        <p:spPr>
+          <a:xfrm>
+            <a:off x="2571736" y="1714488"/>
+            <a:ext cx="1285884" cy="642942"/>
+          </a:xfrm>
+          <a:prstGeom prst="roundRect">
+            <a:avLst/>
+          </a:prstGeom>
+        </p:spPr>
+        <p:style>
+          <a:lnRef idx="0">
+            <a:schemeClr val="accent1"/>
+          </a:lnRef>
+          <a:fillRef idx="3">
+            <a:schemeClr val="accent1"/>
+          </a:fillRef>
+          <a:effectRef idx="3">
+            <a:schemeClr val="accent1"/>
+          </a:effectRef>
+          <a:fontRef idx="minor">
+            <a:schemeClr val="lt1"/>
+          </a:fontRef>
+        </p:style>
+        <p:txBody>
+          <a:bodyPr rtlCol="0" anchor="ctr"/>
+          <a:lstStyle/>
+          <a:p>
+            <a:pPr algn="ctr"/>
+            <a:r>
+              <a:rPr lang="en-US" b="1" dirty="0" smtClean="0">
+                <a:solidFill>
+                  <a:schemeClr val="bg1"/>
+                </a:solidFill>
+              </a:rPr>
+              <a:t>Tree Model</a:t>
+            </a:r>
+            <a:endParaRPr lang="it-IT" b="1" dirty="0">
+              <a:solidFill>
+                <a:schemeClr val="bg1"/>
+              </a:solidFill>
+            </a:endParaRPr>
+          </a:p>
+        </p:txBody>
+      </p:sp>
+      <p:cxnSp>
+        <p:nvCxnSpPr>
+          <p:cNvPr id="76" name="Connettore 2 75"/>
+          <p:cNvCxnSpPr>
+            <a:stCxn id="74" idx="0"/>
+            <a:endCxn id="11" idx="1"/>
+          </p:cNvCxnSpPr>
+          <p:nvPr/>
+        </p:nvCxnSpPr>
+        <p:spPr>
+          <a:xfrm rot="5400000" flipH="1" flipV="1">
+            <a:off x="3000364" y="1500174"/>
+            <a:ext cx="428628" cy="1588"/>
+          </a:xfrm>
+          <a:prstGeom prst="straightConnector1">
+            <a:avLst/>
+          </a:prstGeom>
+          <a:ln>
+            <a:tailEnd type="arrow"/>
+          </a:ln>
+        </p:spPr>
+        <p:style>
+          <a:lnRef idx="2">
+            <a:schemeClr val="dk1"/>
+          </a:lnRef>
+          <a:fillRef idx="0">
+            <a:schemeClr val="dk1"/>
+          </a:fillRef>
+          <a:effectRef idx="1">
+            <a:schemeClr val="dk1"/>
+          </a:effectRef>
+          <a:fontRef idx="minor">
+            <a:schemeClr val="tx1"/>
+          </a:fontRef>
+        </p:style>
+      </p:cxnSp>
+      <p:cxnSp>
+        <p:nvCxnSpPr>
+          <p:cNvPr id="83" name="Connettore 2 82"/>
+          <p:cNvCxnSpPr>
+            <a:stCxn id="74" idx="2"/>
+            <a:endCxn id="73" idx="0"/>
+          </p:cNvCxnSpPr>
+          <p:nvPr/>
+        </p:nvCxnSpPr>
+        <p:spPr>
+          <a:xfrm rot="5400000">
+            <a:off x="2857488" y="2714620"/>
+            <a:ext cx="714380" cy="1588"/>
+          </a:xfrm>
+          <a:prstGeom prst="straightConnector1">
+            <a:avLst/>
+          </a:prstGeom>
+          <a:ln>
+            <a:headEnd type="arrow"/>
+            <a:tailEnd type="arrow"/>
+          </a:ln>
+        </p:spPr>
+        <p:style>
+          <a:lnRef idx="3">
+            <a:schemeClr val="dk1"/>
+          </a:lnRef>
+          <a:fillRef idx="0">
+            <a:schemeClr val="dk1"/>
+          </a:fillRef>
+          <a:effectRef idx="2">
+            <a:schemeClr val="dk1"/>
+          </a:effectRef>
+          <a:fontRef idx="minor">
+            <a:schemeClr val="tx1"/>
+          </a:fontRef>
+        </p:style>
+      </p:cxnSp>
+      <p:cxnSp>
+        <p:nvCxnSpPr>
+          <p:cNvPr id="85" name="Connettore 4 84"/>
+          <p:cNvCxnSpPr>
+            <a:stCxn id="73" idx="3"/>
+            <a:endCxn id="15" idx="1"/>
+          </p:cNvCxnSpPr>
+          <p:nvPr/>
+        </p:nvCxnSpPr>
+        <p:spPr>
+          <a:xfrm flipV="1">
+            <a:off x="4071934" y="2821777"/>
+            <a:ext cx="500066" cy="607223"/>
+          </a:xfrm>
+          <a:prstGeom prst="bentConnector3">
+            <a:avLst>
+              <a:gd name="adj1" fmla="val 50000"/>
+            </a:avLst>
+          </a:prstGeom>
+          <a:ln>
+            <a:prstDash val="dash"/>
+            <a:tailEnd type="arrow"/>
+          </a:ln>
+        </p:spPr>
+        <p:style>
+          <a:lnRef idx="2">
+            <a:schemeClr val="dk1"/>
+          </a:lnRef>
+          <a:fillRef idx="0">
+            <a:schemeClr val="dk1"/>
+          </a:fillRef>
+          <a:effectRef idx="1">
+            <a:schemeClr val="dk1"/>
+          </a:effectRef>
+          <a:fontRef idx="minor">
+            <a:schemeClr val="tx1"/>
+          </a:fontRef>
+        </p:style>
+      </p:cxnSp>
+      <p:sp>
+        <p:nvSpPr>
+          <p:cNvPr id="89" name="Rettangolo arrotondato 88"/>
+          <p:cNvSpPr/>
+          <p:nvPr/>
+        </p:nvSpPr>
+        <p:spPr>
+          <a:xfrm>
+            <a:off x="7929586" y="1714488"/>
+            <a:ext cx="928694" cy="3286148"/>
+          </a:xfrm>
+          <a:prstGeom prst="roundRect">
+            <a:avLst/>
+          </a:prstGeom>
+        </p:spPr>
+        <p:style>
+          <a:lnRef idx="3">
+            <a:schemeClr val="lt1"/>
+          </a:lnRef>
+          <a:fillRef idx="1">
+            <a:schemeClr val="accent6"/>
+          </a:fillRef>
+          <a:effectRef idx="1">
+            <a:schemeClr val="accent6"/>
+          </a:effectRef>
+          <a:fontRef idx="minor">
+            <a:schemeClr val="lt1"/>
+          </a:fontRef>
+        </p:style>
+        <p:txBody>
+          <a:bodyPr vert="wordArtVert" rtlCol="0" anchor="ctr"/>
+          <a:lstStyle/>
+          <a:p>
+            <a:pPr algn="ctr"/>
+            <a:r>
+              <a:rPr lang="en-US" b="1" dirty="0" err="1" smtClean="0"/>
+              <a:t>Plugin</a:t>
+            </a:r>
+            <a:r>
+              <a:rPr lang="en-US" b="1" dirty="0" smtClean="0"/>
+              <a:t> Framework</a:t>
+            </a:r>
+            <a:endParaRPr lang="it-IT" b="1" dirty="0"/>
+          </a:p>
+        </p:txBody>
+      </p:sp>
+      <p:sp>
+        <p:nvSpPr>
+          <p:cNvPr id="91" name="Rettangolo arrotondato 90"/>
+          <p:cNvSpPr/>
+          <p:nvPr/>
+        </p:nvSpPr>
+        <p:spPr>
+          <a:xfrm>
+            <a:off x="8196725" y="1017184"/>
+            <a:ext cx="785818" cy="428628"/>
+          </a:xfrm>
+          <a:prstGeom prst="roundRect">
+            <a:avLst/>
+          </a:prstGeom>
+        </p:spPr>
+        <p:style>
+          <a:lnRef idx="1">
+            <a:schemeClr val="accent6"/>
+          </a:lnRef>
+          <a:fillRef idx="2">
+            <a:schemeClr val="accent6"/>
+          </a:fillRef>
+          <a:effectRef idx="1">
+            <a:schemeClr val="accent6"/>
+          </a:effectRef>
+          <a:fontRef idx="minor">
+            <a:schemeClr val="dk1"/>
+          </a:fontRef>
+        </p:style>
+        <p:txBody>
+          <a:bodyPr rtlCol="0" anchor="ctr"/>
+          <a:lstStyle/>
+          <a:p>
+            <a:pPr algn="ctr"/>
+            <a:endParaRPr lang="it-IT" dirty="0"/>
+          </a:p>
+        </p:txBody>
+      </p:sp>
+      <p:sp>
+        <p:nvSpPr>
+          <p:cNvPr id="90" name="Rettangolo arrotondato 89"/>
+          <p:cNvSpPr/>
+          <p:nvPr/>
+        </p:nvSpPr>
+        <p:spPr>
+          <a:xfrm>
+            <a:off x="8044325" y="1160060"/>
+            <a:ext cx="785818" cy="428628"/>
+          </a:xfrm>
+          <a:prstGeom prst="roundRect">
+            <a:avLst/>
+          </a:prstGeom>
+        </p:spPr>
+        <p:style>
+          <a:lnRef idx="1">
+            <a:schemeClr val="accent6"/>
+          </a:lnRef>
+          <a:fillRef idx="2">
+            <a:schemeClr val="accent6"/>
+          </a:fillRef>
+          <a:effectRef idx="1">
+            <a:schemeClr val="accent6"/>
+          </a:effectRef>
+          <a:fontRef idx="minor">
+            <a:schemeClr val="dk1"/>
+          </a:fontRef>
+        </p:style>
+        <p:txBody>
+          <a:bodyPr rtlCol="0" anchor="ctr"/>
+          <a:lstStyle/>
+          <a:p>
+            <a:pPr algn="ctr"/>
+            <a:r>
+              <a:rPr lang="en-US" b="1" dirty="0" smtClean="0"/>
+              <a:t>Proxy</a:t>
+            </a:r>
+            <a:endParaRPr lang="it-IT" b="1" dirty="0"/>
+          </a:p>
+        </p:txBody>
+      </p:sp>
+      <p:sp>
+        <p:nvSpPr>
+          <p:cNvPr id="92" name="Arrotonda angolo diagonale rettangolo 91"/>
+          <p:cNvSpPr/>
+          <p:nvPr/>
+        </p:nvSpPr>
+        <p:spPr>
+          <a:xfrm>
+            <a:off x="7072330" y="142852"/>
+            <a:ext cx="928694" cy="357190"/>
+          </a:xfrm>
+          <a:prstGeom prst="round2DiagRect">
+            <a:avLst/>
+          </a:prstGeom>
+        </p:spPr>
+        <p:style>
+          <a:lnRef idx="0">
+            <a:schemeClr val="accent6"/>
+          </a:lnRef>
+          <a:fillRef idx="3">
+            <a:schemeClr val="accent6"/>
+          </a:fillRef>
+          <a:effectRef idx="3">
+            <a:schemeClr val="accent6"/>
+          </a:effectRef>
+          <a:fontRef idx="minor">
+            <a:schemeClr val="lt1"/>
+          </a:fontRef>
+        </p:style>
+        <p:txBody>
+          <a:bodyPr rtlCol="0" anchor="ctr"/>
+          <a:lstStyle/>
+          <a:p>
+            <a:pPr algn="ctr"/>
+            <a:r>
+              <a:rPr lang="en-US" b="1" dirty="0" err="1" smtClean="0">
+                <a:solidFill>
+                  <a:schemeClr val="tx1"/>
+                </a:solidFill>
+              </a:rPr>
+              <a:t>Plugin</a:t>
+            </a:r>
+            <a:endParaRPr lang="it-IT" b="1" dirty="0">
+              <a:solidFill>
+                <a:schemeClr val="tx1"/>
+              </a:solidFill>
+            </a:endParaRPr>
+          </a:p>
+        </p:txBody>
+      </p:sp>
+      <p:sp>
+        <p:nvSpPr>
+          <p:cNvPr id="93" name="Arrotonda angolo diagonale rettangolo 92"/>
+          <p:cNvSpPr/>
+          <p:nvPr/>
+        </p:nvSpPr>
+        <p:spPr>
+          <a:xfrm>
+            <a:off x="8215306" y="0"/>
+            <a:ext cx="928694" cy="357190"/>
+          </a:xfrm>
+          <a:prstGeom prst="round2DiagRect">
+            <a:avLst/>
+          </a:prstGeom>
+        </p:spPr>
+        <p:style>
+          <a:lnRef idx="0">
+            <a:schemeClr val="accent6"/>
+          </a:lnRef>
+          <a:fillRef idx="3">
+            <a:schemeClr val="accent6"/>
+          </a:fillRef>
+          <a:effectRef idx="3">
+            <a:schemeClr val="accent6"/>
+          </a:effectRef>
+          <a:fontRef idx="minor">
+            <a:schemeClr val="lt1"/>
+          </a:fontRef>
+        </p:style>
+        <p:txBody>
+          <a:bodyPr rtlCol="0" anchor="ctr"/>
+          <a:lstStyle/>
+          <a:p>
+            <a:pPr algn="ctr"/>
+            <a:r>
+              <a:rPr lang="en-US" b="1" dirty="0" err="1" smtClean="0">
+                <a:solidFill>
+                  <a:schemeClr val="tx1"/>
+                </a:solidFill>
+              </a:rPr>
+              <a:t>Plugin</a:t>
+            </a:r>
+            <a:endParaRPr lang="it-IT" b="1" dirty="0">
+              <a:solidFill>
+                <a:schemeClr val="tx1"/>
+              </a:solidFill>
+            </a:endParaRPr>
+          </a:p>
+        </p:txBody>
+      </p:sp>
+      <p:cxnSp>
+        <p:nvCxnSpPr>
+          <p:cNvPr id="95" name="Connettore 7 94"/>
+          <p:cNvCxnSpPr>
+            <a:stCxn id="92" idx="1"/>
+            <a:endCxn id="90" idx="0"/>
+          </p:cNvCxnSpPr>
+          <p:nvPr/>
+        </p:nvCxnSpPr>
+        <p:spPr>
+          <a:xfrm rot="16200000" flipH="1">
+            <a:off x="7656946" y="379772"/>
+            <a:ext cx="660018" cy="900557"/>
+          </a:xfrm>
+          <a:prstGeom prst="curvedConnector3">
+            <a:avLst>
+              <a:gd name="adj1" fmla="val 50000"/>
+            </a:avLst>
+          </a:prstGeom>
+        </p:spPr>
+        <p:style>
+          <a:lnRef idx="1">
+            <a:schemeClr val="accent1"/>
+          </a:lnRef>
+          <a:fillRef idx="0">
+            <a:schemeClr val="accent1"/>
+          </a:fillRef>
+          <a:effectRef idx="0">
+            <a:schemeClr val="accent1"/>
+          </a:effectRef>
+          <a:fontRef idx="minor">
+            <a:schemeClr val="tx1"/>
+          </a:fontRef>
+        </p:style>
+      </p:cxnSp>
+      <p:cxnSp>
+        <p:nvCxnSpPr>
+          <p:cNvPr id="97" name="Connettore 7 96"/>
+          <p:cNvCxnSpPr>
+            <a:stCxn id="91" idx="0"/>
+            <a:endCxn id="93" idx="1"/>
+          </p:cNvCxnSpPr>
+          <p:nvPr/>
+        </p:nvCxnSpPr>
+        <p:spPr>
+          <a:xfrm rot="5400000" flipH="1" flipV="1">
+            <a:off x="8304646" y="642178"/>
+            <a:ext cx="659994" cy="90019"/>
+          </a:xfrm>
+          <a:prstGeom prst="curvedConnector3">
+            <a:avLst>
+              <a:gd name="adj1" fmla="val 50000"/>
+            </a:avLst>
+          </a:prstGeom>
+        </p:spPr>
+        <p:style>
+          <a:lnRef idx="1">
+            <a:schemeClr val="accent1"/>
+          </a:lnRef>
+          <a:fillRef idx="0">
+            <a:schemeClr val="accent1"/>
+          </a:fillRef>
+          <a:effectRef idx="0">
+            <a:schemeClr val="accent1"/>
+          </a:effectRef>
+          <a:fontRef idx="minor">
+            <a:schemeClr val="tx1"/>
+          </a:fontRef>
+        </p:style>
+      </p:cxnSp>
+      <p:cxnSp>
+        <p:nvCxnSpPr>
+          <p:cNvPr id="103" name="Connettore 1 102"/>
+          <p:cNvCxnSpPr>
+            <a:stCxn id="90" idx="2"/>
+            <a:endCxn id="89" idx="0"/>
+          </p:cNvCxnSpPr>
+          <p:nvPr/>
+        </p:nvCxnSpPr>
+        <p:spPr>
+          <a:xfrm rot="5400000">
+            <a:off x="8352684" y="1629938"/>
+            <a:ext cx="125800" cy="43301"/>
+          </a:xfrm>
+          <a:prstGeom prst="line">
+            <a:avLst/>
+          </a:prstGeom>
+        </p:spPr>
+        <p:style>
+          <a:lnRef idx="3">
+            <a:schemeClr val="dk1"/>
+          </a:lnRef>
+          <a:fillRef idx="0">
+            <a:schemeClr val="dk1"/>
+          </a:fillRef>
+          <a:effectRef idx="2">
+            <a:schemeClr val="dk1"/>
+          </a:effectRef>
+          <a:fontRef idx="minor">
+            <a:schemeClr val="tx1"/>
+          </a:fontRef>
+        </p:style>
+      </p:cxnSp>
     </p:spTree>
   </p:cSld>
   <p:clrMapOvr>

</xml_diff>

<commit_message>
slides (components diagram done)
</commit_message>
<xml_diff>
--- a/thesis_adf/presentazione_tesi/presentazione.pptx
+++ b/thesis_adf/presentazione_tesi/presentazione.pptx
@@ -14230,16 +14230,20 @@
               <a:gd name="adj1" fmla="val 50000"/>
             </a:avLst>
           </a:prstGeom>
+          <a:ln>
+            <a:prstDash val="solid"/>
+            <a:tailEnd type="oval"/>
+          </a:ln>
         </p:spPr>
         <p:style>
-          <a:lnRef idx="1">
-            <a:schemeClr val="accent1"/>
+          <a:lnRef idx="2">
+            <a:schemeClr val="dk1"/>
           </a:lnRef>
           <a:fillRef idx="0">
-            <a:schemeClr val="accent1"/>
+            <a:schemeClr val="dk1"/>
           </a:fillRef>
-          <a:effectRef idx="0">
-            <a:schemeClr val="accent1"/>
+          <a:effectRef idx="1">
+            <a:schemeClr val="dk1"/>
           </a:effectRef>
           <a:fontRef idx="minor">
             <a:schemeClr val="tx1"/>
@@ -14265,16 +14269,21 @@
               <a:gd name="adj1" fmla="val 50000"/>
             </a:avLst>
           </a:prstGeom>
+          <a:ln>
+            <a:prstDash val="solid"/>
+            <a:headEnd type="oval"/>
+            <a:tailEnd type="none"/>
+          </a:ln>
         </p:spPr>
         <p:style>
-          <a:lnRef idx="1">
-            <a:schemeClr val="accent1"/>
+          <a:lnRef idx="2">
+            <a:schemeClr val="dk1"/>
           </a:lnRef>
           <a:fillRef idx="0">
-            <a:schemeClr val="accent1"/>
+            <a:schemeClr val="dk1"/>
           </a:fillRef>
-          <a:effectRef idx="0">
-            <a:schemeClr val="accent1"/>
+          <a:effectRef idx="1">
+            <a:schemeClr val="dk1"/>
           </a:effectRef>
           <a:fontRef idx="minor">
             <a:schemeClr val="tx1"/>
@@ -14314,6 +14323,261 @@
           </a:fontRef>
         </p:style>
       </p:cxnSp>
+      <p:sp>
+        <p:nvSpPr>
+          <p:cNvPr id="104" name="CasellaDiTesto 103"/>
+          <p:cNvSpPr txBox="1"/>
+          <p:nvPr/>
+        </p:nvSpPr>
+        <p:spPr>
+          <a:xfrm>
+            <a:off x="0" y="500042"/>
+            <a:ext cx="2285984" cy="954107"/>
+          </a:xfrm>
+          <a:prstGeom prst="rect">
+            <a:avLst/>
+          </a:prstGeom>
+          <a:noFill/>
+        </p:spPr>
+        <p:txBody>
+          <a:bodyPr wrap="square" rtlCol="0">
+            <a:spAutoFit/>
+          </a:bodyPr>
+          <a:lstStyle/>
+          <a:p>
+            <a:pPr algn="ctr"/>
+            <a:r>
+              <a:rPr lang="en-US" sz="2800" dirty="0" err="1" smtClean="0"/>
+              <a:t>Componenti</a:t>
+            </a:r>
+            <a:r>
+              <a:rPr lang="en-US" sz="2800" dirty="0" smtClean="0"/>
+              <a:t> </a:t>
+            </a:r>
+          </a:p>
+          <a:p>
+            <a:pPr algn="ctr"/>
+            <a:r>
+              <a:rPr lang="en-US" sz="2800" dirty="0" err="1" smtClean="0"/>
+              <a:t>VisualNetkit</a:t>
+            </a:r>
+            <a:endParaRPr lang="it-IT" sz="2800" dirty="0"/>
+          </a:p>
+        </p:txBody>
+      </p:sp>
+      <p:sp>
+        <p:nvSpPr>
+          <p:cNvPr id="105" name="CasellaDiTesto 104"/>
+          <p:cNvSpPr txBox="1"/>
+          <p:nvPr/>
+        </p:nvSpPr>
+        <p:spPr>
+          <a:xfrm>
+            <a:off x="0" y="1571612"/>
+            <a:ext cx="2285983" cy="707886"/>
+          </a:xfrm>
+          <a:prstGeom prst="rect">
+            <a:avLst/>
+          </a:prstGeom>
+          <a:noFill/>
+        </p:spPr>
+        <p:txBody>
+          <a:bodyPr wrap="square" rtlCol="0">
+            <a:spAutoFit/>
+          </a:bodyPr>
+          <a:lstStyle/>
+          <a:p>
+            <a:pPr marL="342900" indent="-342900">
+              <a:buFont typeface="Wingdings" pitchFamily="2" charset="2"/>
+              <a:buChar char="Ø"/>
+            </a:pPr>
+            <a:r>
+              <a:rPr lang="en-US" sz="2000" dirty="0" smtClean="0"/>
+              <a:t>Prima </a:t>
+            </a:r>
+            <a:r>
+              <a:rPr lang="en-US" sz="2000" dirty="0" err="1" smtClean="0"/>
+              <a:t>soluzione</a:t>
+            </a:r>
+            <a:r>
+              <a:rPr lang="en-US" sz="2000" dirty="0" smtClean="0"/>
+              <a:t> </a:t>
+            </a:r>
+            <a:r>
+              <a:rPr lang="it-IT" sz="2000" dirty="0" smtClean="0"/>
+              <a:t> monolitica</a:t>
+            </a:r>
+          </a:p>
+        </p:txBody>
+      </p:sp>
+      <p:sp>
+        <p:nvSpPr>
+          <p:cNvPr id="107" name="CasellaDiTesto 106"/>
+          <p:cNvSpPr txBox="1"/>
+          <p:nvPr/>
+        </p:nvSpPr>
+        <p:spPr>
+          <a:xfrm>
+            <a:off x="0" y="2428868"/>
+            <a:ext cx="2285983" cy="1631216"/>
+          </a:xfrm>
+          <a:prstGeom prst="rect">
+            <a:avLst/>
+          </a:prstGeom>
+          <a:noFill/>
+        </p:spPr>
+        <p:txBody>
+          <a:bodyPr wrap="square" rtlCol="0">
+            <a:spAutoFit/>
+          </a:bodyPr>
+          <a:lstStyle/>
+          <a:p>
+            <a:pPr marL="342900" indent="-342900">
+              <a:buFont typeface="Wingdings" pitchFamily="2" charset="2"/>
+              <a:buChar char="Ø"/>
+            </a:pPr>
+            <a:r>
+              <a:rPr lang="en-US" sz="2000" dirty="0" err="1" smtClean="0"/>
+              <a:t>Introduzione</a:t>
+            </a:r>
+            <a:r>
+              <a:rPr lang="en-US" sz="2000" dirty="0" smtClean="0"/>
+              <a:t> del </a:t>
+            </a:r>
+            <a:r>
+              <a:rPr lang="en-US" sz="2000" dirty="0" err="1" smtClean="0"/>
+              <a:t>plugin</a:t>
+            </a:r>
+            <a:r>
+              <a:rPr lang="en-US" sz="2000" dirty="0" smtClean="0"/>
+              <a:t> framework e </a:t>
+            </a:r>
+            <a:r>
+              <a:rPr lang="en-US" sz="2000" dirty="0" err="1" smtClean="0"/>
+              <a:t>aumento</a:t>
+            </a:r>
+            <a:r>
+              <a:rPr lang="en-US" sz="2000" dirty="0" smtClean="0"/>
+              <a:t> </a:t>
+            </a:r>
+            <a:r>
+              <a:rPr lang="en-US" sz="2000" dirty="0" err="1" smtClean="0"/>
+              <a:t>della</a:t>
+            </a:r>
+            <a:r>
+              <a:rPr lang="en-US" sz="2000" dirty="0" smtClean="0"/>
+              <a:t> </a:t>
+            </a:r>
+            <a:r>
+              <a:rPr lang="en-US" sz="2000" dirty="0" err="1" smtClean="0"/>
+              <a:t>flessibilità</a:t>
+            </a:r>
+            <a:endParaRPr lang="en-US" sz="2000" dirty="0" smtClean="0"/>
+          </a:p>
+        </p:txBody>
+      </p:sp>
+      <p:sp>
+        <p:nvSpPr>
+          <p:cNvPr id="108" name="CasellaDiTesto 107"/>
+          <p:cNvSpPr txBox="1"/>
+          <p:nvPr/>
+        </p:nvSpPr>
+        <p:spPr>
+          <a:xfrm>
+            <a:off x="0" y="4214818"/>
+            <a:ext cx="2285983" cy="1938992"/>
+          </a:xfrm>
+          <a:prstGeom prst="rect">
+            <a:avLst/>
+          </a:prstGeom>
+          <a:noFill/>
+        </p:spPr>
+        <p:txBody>
+          <a:bodyPr wrap="square" rtlCol="0">
+            <a:spAutoFit/>
+          </a:bodyPr>
+          <a:lstStyle/>
+          <a:p>
+            <a:pPr marL="342900" indent="-342900">
+              <a:buFont typeface="Wingdings" pitchFamily="2" charset="2"/>
+              <a:buChar char="Ø"/>
+            </a:pPr>
+            <a:r>
+              <a:rPr lang="en-US" sz="2000" dirty="0" err="1" smtClean="0"/>
+              <a:t>Estensione</a:t>
+            </a:r>
+            <a:r>
+              <a:rPr lang="en-US" sz="2000" dirty="0" smtClean="0"/>
+              <a:t> </a:t>
+            </a:r>
+            <a:r>
+              <a:rPr lang="en-US" sz="2000" dirty="0" err="1" smtClean="0"/>
+              <a:t>delle</a:t>
+            </a:r>
+            <a:r>
+              <a:rPr lang="en-US" sz="2000" dirty="0" smtClean="0"/>
+              <a:t> property </a:t>
+            </a:r>
+            <a:r>
+              <a:rPr lang="en-US" sz="2000" dirty="0" err="1" smtClean="0"/>
+              <a:t>dei</a:t>
+            </a:r>
+            <a:r>
+              <a:rPr lang="en-US" sz="2000" dirty="0" smtClean="0"/>
+              <a:t> </a:t>
+            </a:r>
+            <a:r>
+              <a:rPr lang="en-US" sz="2000" dirty="0" err="1" smtClean="0"/>
+              <a:t>plugin</a:t>
+            </a:r>
+            <a:r>
+              <a:rPr lang="en-US" sz="2000" dirty="0" smtClean="0"/>
+              <a:t>. </a:t>
+            </a:r>
+            <a:r>
+              <a:rPr lang="en-US" sz="2000" dirty="0" err="1" smtClean="0"/>
+              <a:t>Pieno</a:t>
+            </a:r>
+            <a:r>
+              <a:rPr lang="en-US" sz="2000" dirty="0" smtClean="0"/>
+              <a:t> </a:t>
+            </a:r>
+            <a:r>
+              <a:rPr lang="en-US" sz="2000" dirty="0" err="1" smtClean="0"/>
+              <a:t>supporto</a:t>
+            </a:r>
+            <a:r>
+              <a:rPr lang="en-US" sz="2000" dirty="0" smtClean="0"/>
+              <a:t> </a:t>
+            </a:r>
+            <a:r>
+              <a:rPr lang="en-US" sz="2000" dirty="0" err="1" smtClean="0"/>
+              <a:t>alle</a:t>
+            </a:r>
+            <a:r>
+              <a:rPr lang="en-US" sz="2000" dirty="0" smtClean="0"/>
+              <a:t> </a:t>
+            </a:r>
+            <a:r>
+              <a:rPr lang="en-US" sz="2000" dirty="0" err="1" smtClean="0"/>
+              <a:t>configurazioni</a:t>
+            </a:r>
+            <a:r>
+              <a:rPr lang="en-US" sz="2000" dirty="0" smtClean="0"/>
+              <a:t> </a:t>
+            </a:r>
+            <a:r>
+              <a:rPr lang="en-US" sz="2000" dirty="0" err="1" smtClean="0"/>
+              <a:t>avanzate</a:t>
+            </a:r>
+            <a:r>
+              <a:rPr lang="en-US" sz="2000" dirty="0" smtClean="0"/>
+              <a:t>.</a:t>
+            </a:r>
+            <a:endParaRPr lang="en-US" sz="2000" dirty="0" smtClean="0"/>
+          </a:p>
+        </p:txBody>
+      </p:sp>
     </p:spTree>
   </p:cSld>
   <p:clrMapOvr>
@@ -14325,9 +14589,808 @@
   <p:timing>
     <p:tnLst>
       <p:par>
-        <p:cTn id="1" dur="indefinite" restart="never" nodeType="tmRoot"/>
+        <p:cTn id="1" dur="indefinite" restart="never" nodeType="tmRoot">
+          <p:childTnLst>
+            <p:seq concurrent="1" nextAc="seek">
+              <p:cTn id="2" dur="indefinite" nodeType="mainSeq">
+                <p:childTnLst>
+                  <p:par>
+                    <p:cTn id="3" fill="hold">
+                      <p:stCondLst>
+                        <p:cond delay="indefinite"/>
+                      </p:stCondLst>
+                      <p:childTnLst>
+                        <p:par>
+                          <p:cTn id="4" fill="hold">
+                            <p:stCondLst>
+                              <p:cond delay="0"/>
+                            </p:stCondLst>
+                            <p:childTnLst>
+                              <p:par>
+                                <p:cTn id="5" presetID="2" presetClass="entr" presetSubtype="4" fill="hold" grpId="0" nodeType="clickEffect">
+                                  <p:stCondLst>
+                                    <p:cond delay="0"/>
+                                  </p:stCondLst>
+                                  <p:childTnLst>
+                                    <p:set>
+                                      <p:cBhvr>
+                                        <p:cTn id="6" dur="1" fill="hold">
+                                          <p:stCondLst>
+                                            <p:cond delay="0"/>
+                                          </p:stCondLst>
+                                        </p:cTn>
+                                        <p:tgtEl>
+                                          <p:spTgt spid="105"/>
+                                        </p:tgtEl>
+                                        <p:attrNameLst>
+                                          <p:attrName>style.visibility</p:attrName>
+                                        </p:attrNameLst>
+                                      </p:cBhvr>
+                                      <p:to>
+                                        <p:strVal val="visible"/>
+                                      </p:to>
+                                    </p:set>
+                                    <p:anim calcmode="lin" valueType="num">
+                                      <p:cBhvr additive="base">
+                                        <p:cTn id="7" dur="500" fill="hold"/>
+                                        <p:tgtEl>
+                                          <p:spTgt spid="105"/>
+                                        </p:tgtEl>
+                                        <p:attrNameLst>
+                                          <p:attrName>ppt_x</p:attrName>
+                                        </p:attrNameLst>
+                                      </p:cBhvr>
+                                      <p:tavLst>
+                                        <p:tav tm="0">
+                                          <p:val>
+                                            <p:strVal val="#ppt_x"/>
+                                          </p:val>
+                                        </p:tav>
+                                        <p:tav tm="100000">
+                                          <p:val>
+                                            <p:strVal val="#ppt_x"/>
+                                          </p:val>
+                                        </p:tav>
+                                      </p:tavLst>
+                                    </p:anim>
+                                    <p:anim calcmode="lin" valueType="num">
+                                      <p:cBhvr additive="base">
+                                        <p:cTn id="8" dur="500" fill="hold"/>
+                                        <p:tgtEl>
+                                          <p:spTgt spid="105"/>
+                                        </p:tgtEl>
+                                        <p:attrNameLst>
+                                          <p:attrName>ppt_y</p:attrName>
+                                        </p:attrNameLst>
+                                      </p:cBhvr>
+                                      <p:tavLst>
+                                        <p:tav tm="0">
+                                          <p:val>
+                                            <p:strVal val="1+#ppt_h/2"/>
+                                          </p:val>
+                                        </p:tav>
+                                        <p:tav tm="100000">
+                                          <p:val>
+                                            <p:strVal val="#ppt_y"/>
+                                          </p:val>
+                                        </p:tav>
+                                      </p:tavLst>
+                                    </p:anim>
+                                  </p:childTnLst>
+                                </p:cTn>
+                              </p:par>
+                            </p:childTnLst>
+                          </p:cTn>
+                        </p:par>
+                      </p:childTnLst>
+                    </p:cTn>
+                  </p:par>
+                  <p:par>
+                    <p:cTn id="9" fill="hold">
+                      <p:stCondLst>
+                        <p:cond delay="indefinite"/>
+                      </p:stCondLst>
+                      <p:childTnLst>
+                        <p:par>
+                          <p:cTn id="10" fill="hold">
+                            <p:stCondLst>
+                              <p:cond delay="0"/>
+                            </p:stCondLst>
+                            <p:childTnLst>
+                              <p:par>
+                                <p:cTn id="11" presetID="2" presetClass="entr" presetSubtype="4" fill="hold" grpId="0" nodeType="clickEffect">
+                                  <p:stCondLst>
+                                    <p:cond delay="0"/>
+                                  </p:stCondLst>
+                                  <p:childTnLst>
+                                    <p:set>
+                                      <p:cBhvr>
+                                        <p:cTn id="12" dur="1" fill="hold">
+                                          <p:stCondLst>
+                                            <p:cond delay="0"/>
+                                          </p:stCondLst>
+                                        </p:cTn>
+                                        <p:tgtEl>
+                                          <p:spTgt spid="107"/>
+                                        </p:tgtEl>
+                                        <p:attrNameLst>
+                                          <p:attrName>style.visibility</p:attrName>
+                                        </p:attrNameLst>
+                                      </p:cBhvr>
+                                      <p:to>
+                                        <p:strVal val="visible"/>
+                                      </p:to>
+                                    </p:set>
+                                    <p:anim calcmode="lin" valueType="num">
+                                      <p:cBhvr additive="base">
+                                        <p:cTn id="13" dur="500" fill="hold"/>
+                                        <p:tgtEl>
+                                          <p:spTgt spid="107"/>
+                                        </p:tgtEl>
+                                        <p:attrNameLst>
+                                          <p:attrName>ppt_x</p:attrName>
+                                        </p:attrNameLst>
+                                      </p:cBhvr>
+                                      <p:tavLst>
+                                        <p:tav tm="0">
+                                          <p:val>
+                                            <p:strVal val="#ppt_x"/>
+                                          </p:val>
+                                        </p:tav>
+                                        <p:tav tm="100000">
+                                          <p:val>
+                                            <p:strVal val="#ppt_x"/>
+                                          </p:val>
+                                        </p:tav>
+                                      </p:tavLst>
+                                    </p:anim>
+                                    <p:anim calcmode="lin" valueType="num">
+                                      <p:cBhvr additive="base">
+                                        <p:cTn id="14" dur="500" fill="hold"/>
+                                        <p:tgtEl>
+                                          <p:spTgt spid="107"/>
+                                        </p:tgtEl>
+                                        <p:attrNameLst>
+                                          <p:attrName>ppt_y</p:attrName>
+                                        </p:attrNameLst>
+                                      </p:cBhvr>
+                                      <p:tavLst>
+                                        <p:tav tm="0">
+                                          <p:val>
+                                            <p:strVal val="1+#ppt_h/2"/>
+                                          </p:val>
+                                        </p:tav>
+                                        <p:tav tm="100000">
+                                          <p:val>
+                                            <p:strVal val="#ppt_y"/>
+                                          </p:val>
+                                        </p:tav>
+                                      </p:tavLst>
+                                    </p:anim>
+                                  </p:childTnLst>
+                                </p:cTn>
+                              </p:par>
+                            </p:childTnLst>
+                          </p:cTn>
+                        </p:par>
+                      </p:childTnLst>
+                    </p:cTn>
+                  </p:par>
+                  <p:par>
+                    <p:cTn id="15" fill="hold">
+                      <p:stCondLst>
+                        <p:cond delay="indefinite"/>
+                      </p:stCondLst>
+                      <p:childTnLst>
+                        <p:par>
+                          <p:cTn id="16" fill="hold">
+                            <p:stCondLst>
+                              <p:cond delay="0"/>
+                            </p:stCondLst>
+                            <p:childTnLst>
+                              <p:par>
+                                <p:cTn id="17" presetID="10" presetClass="entr" presetSubtype="0" fill="hold" grpId="0" nodeType="clickEffect">
+                                  <p:stCondLst>
+                                    <p:cond delay="0"/>
+                                  </p:stCondLst>
+                                  <p:childTnLst>
+                                    <p:set>
+                                      <p:cBhvr>
+                                        <p:cTn id="18" dur="1" fill="hold">
+                                          <p:stCondLst>
+                                            <p:cond delay="0"/>
+                                          </p:stCondLst>
+                                        </p:cTn>
+                                        <p:tgtEl>
+                                          <p:spTgt spid="89"/>
+                                        </p:tgtEl>
+                                        <p:attrNameLst>
+                                          <p:attrName>style.visibility</p:attrName>
+                                        </p:attrNameLst>
+                                      </p:cBhvr>
+                                      <p:to>
+                                        <p:strVal val="visible"/>
+                                      </p:to>
+                                    </p:set>
+                                    <p:animEffect transition="in" filter="fade">
+                                      <p:cBhvr>
+                                        <p:cTn id="19" dur="2000"/>
+                                        <p:tgtEl>
+                                          <p:spTgt spid="89"/>
+                                        </p:tgtEl>
+                                      </p:cBhvr>
+                                    </p:animEffect>
+                                  </p:childTnLst>
+                                </p:cTn>
+                              </p:par>
+                              <p:par>
+                                <p:cTn id="20" presetID="10" presetClass="entr" presetSubtype="0" fill="hold" grpId="0" nodeType="withEffect">
+                                  <p:stCondLst>
+                                    <p:cond delay="0"/>
+                                  </p:stCondLst>
+                                  <p:childTnLst>
+                                    <p:set>
+                                      <p:cBhvr>
+                                        <p:cTn id="21" dur="1" fill="hold">
+                                          <p:stCondLst>
+                                            <p:cond delay="0"/>
+                                          </p:stCondLst>
+                                        </p:cTn>
+                                        <p:tgtEl>
+                                          <p:spTgt spid="91"/>
+                                        </p:tgtEl>
+                                        <p:attrNameLst>
+                                          <p:attrName>style.visibility</p:attrName>
+                                        </p:attrNameLst>
+                                      </p:cBhvr>
+                                      <p:to>
+                                        <p:strVal val="visible"/>
+                                      </p:to>
+                                    </p:set>
+                                    <p:animEffect transition="in" filter="fade">
+                                      <p:cBhvr>
+                                        <p:cTn id="22" dur="2000"/>
+                                        <p:tgtEl>
+                                          <p:spTgt spid="91"/>
+                                        </p:tgtEl>
+                                      </p:cBhvr>
+                                    </p:animEffect>
+                                  </p:childTnLst>
+                                </p:cTn>
+                              </p:par>
+                              <p:par>
+                                <p:cTn id="23" presetID="10" presetClass="entr" presetSubtype="0" fill="hold" grpId="0" nodeType="withEffect">
+                                  <p:stCondLst>
+                                    <p:cond delay="0"/>
+                                  </p:stCondLst>
+                                  <p:childTnLst>
+                                    <p:set>
+                                      <p:cBhvr>
+                                        <p:cTn id="24" dur="1" fill="hold">
+                                          <p:stCondLst>
+                                            <p:cond delay="0"/>
+                                          </p:stCondLst>
+                                        </p:cTn>
+                                        <p:tgtEl>
+                                          <p:spTgt spid="90"/>
+                                        </p:tgtEl>
+                                        <p:attrNameLst>
+                                          <p:attrName>style.visibility</p:attrName>
+                                        </p:attrNameLst>
+                                      </p:cBhvr>
+                                      <p:to>
+                                        <p:strVal val="visible"/>
+                                      </p:to>
+                                    </p:set>
+                                    <p:animEffect transition="in" filter="fade">
+                                      <p:cBhvr>
+                                        <p:cTn id="25" dur="2000"/>
+                                        <p:tgtEl>
+                                          <p:spTgt spid="90"/>
+                                        </p:tgtEl>
+                                      </p:cBhvr>
+                                    </p:animEffect>
+                                  </p:childTnLst>
+                                </p:cTn>
+                              </p:par>
+                              <p:par>
+                                <p:cTn id="26" presetID="10" presetClass="entr" presetSubtype="0" fill="hold" grpId="0" nodeType="withEffect">
+                                  <p:stCondLst>
+                                    <p:cond delay="0"/>
+                                  </p:stCondLst>
+                                  <p:childTnLst>
+                                    <p:set>
+                                      <p:cBhvr>
+                                        <p:cTn id="27" dur="1" fill="hold">
+                                          <p:stCondLst>
+                                            <p:cond delay="0"/>
+                                          </p:stCondLst>
+                                        </p:cTn>
+                                        <p:tgtEl>
+                                          <p:spTgt spid="92"/>
+                                        </p:tgtEl>
+                                        <p:attrNameLst>
+                                          <p:attrName>style.visibility</p:attrName>
+                                        </p:attrNameLst>
+                                      </p:cBhvr>
+                                      <p:to>
+                                        <p:strVal val="visible"/>
+                                      </p:to>
+                                    </p:set>
+                                    <p:animEffect transition="in" filter="fade">
+                                      <p:cBhvr>
+                                        <p:cTn id="28" dur="2000"/>
+                                        <p:tgtEl>
+                                          <p:spTgt spid="92"/>
+                                        </p:tgtEl>
+                                      </p:cBhvr>
+                                    </p:animEffect>
+                                  </p:childTnLst>
+                                </p:cTn>
+                              </p:par>
+                              <p:par>
+                                <p:cTn id="29" presetID="10" presetClass="entr" presetSubtype="0" fill="hold" nodeType="withEffect">
+                                  <p:stCondLst>
+                                    <p:cond delay="0"/>
+                                  </p:stCondLst>
+                                  <p:childTnLst>
+                                    <p:set>
+                                      <p:cBhvr>
+                                        <p:cTn id="30" dur="1" fill="hold">
+                                          <p:stCondLst>
+                                            <p:cond delay="0"/>
+                                          </p:stCondLst>
+                                        </p:cTn>
+                                        <p:tgtEl>
+                                          <p:spTgt spid="95"/>
+                                        </p:tgtEl>
+                                        <p:attrNameLst>
+                                          <p:attrName>style.visibility</p:attrName>
+                                        </p:attrNameLst>
+                                      </p:cBhvr>
+                                      <p:to>
+                                        <p:strVal val="visible"/>
+                                      </p:to>
+                                    </p:set>
+                                    <p:animEffect transition="in" filter="fade">
+                                      <p:cBhvr>
+                                        <p:cTn id="31" dur="2000"/>
+                                        <p:tgtEl>
+                                          <p:spTgt spid="95"/>
+                                        </p:tgtEl>
+                                      </p:cBhvr>
+                                    </p:animEffect>
+                                  </p:childTnLst>
+                                </p:cTn>
+                              </p:par>
+                              <p:par>
+                                <p:cTn id="32" presetID="10" presetClass="entr" presetSubtype="0" fill="hold" nodeType="withEffect">
+                                  <p:stCondLst>
+                                    <p:cond delay="0"/>
+                                  </p:stCondLst>
+                                  <p:childTnLst>
+                                    <p:set>
+                                      <p:cBhvr>
+                                        <p:cTn id="33" dur="1" fill="hold">
+                                          <p:stCondLst>
+                                            <p:cond delay="0"/>
+                                          </p:stCondLst>
+                                        </p:cTn>
+                                        <p:tgtEl>
+                                          <p:spTgt spid="97"/>
+                                        </p:tgtEl>
+                                        <p:attrNameLst>
+                                          <p:attrName>style.visibility</p:attrName>
+                                        </p:attrNameLst>
+                                      </p:cBhvr>
+                                      <p:to>
+                                        <p:strVal val="visible"/>
+                                      </p:to>
+                                    </p:set>
+                                    <p:animEffect transition="in" filter="fade">
+                                      <p:cBhvr>
+                                        <p:cTn id="34" dur="2000"/>
+                                        <p:tgtEl>
+                                          <p:spTgt spid="97"/>
+                                        </p:tgtEl>
+                                      </p:cBhvr>
+                                    </p:animEffect>
+                                  </p:childTnLst>
+                                </p:cTn>
+                              </p:par>
+                              <p:par>
+                                <p:cTn id="35" presetID="10" presetClass="entr" presetSubtype="0" fill="hold" nodeType="withEffect">
+                                  <p:stCondLst>
+                                    <p:cond delay="0"/>
+                                  </p:stCondLst>
+                                  <p:childTnLst>
+                                    <p:set>
+                                      <p:cBhvr>
+                                        <p:cTn id="36" dur="1" fill="hold">
+                                          <p:stCondLst>
+                                            <p:cond delay="0"/>
+                                          </p:stCondLst>
+                                        </p:cTn>
+                                        <p:tgtEl>
+                                          <p:spTgt spid="103"/>
+                                        </p:tgtEl>
+                                        <p:attrNameLst>
+                                          <p:attrName>style.visibility</p:attrName>
+                                        </p:attrNameLst>
+                                      </p:cBhvr>
+                                      <p:to>
+                                        <p:strVal val="visible"/>
+                                      </p:to>
+                                    </p:set>
+                                    <p:animEffect transition="in" filter="fade">
+                                      <p:cBhvr>
+                                        <p:cTn id="37" dur="2000"/>
+                                        <p:tgtEl>
+                                          <p:spTgt spid="103"/>
+                                        </p:tgtEl>
+                                      </p:cBhvr>
+                                    </p:animEffect>
+                                  </p:childTnLst>
+                                </p:cTn>
+                              </p:par>
+                              <p:par>
+                                <p:cTn id="38" presetID="10" presetClass="entr" presetSubtype="0" fill="hold" grpId="0" nodeType="withEffect">
+                                  <p:stCondLst>
+                                    <p:cond delay="0"/>
+                                  </p:stCondLst>
+                                  <p:childTnLst>
+                                    <p:set>
+                                      <p:cBhvr>
+                                        <p:cTn id="39" dur="1" fill="hold">
+                                          <p:stCondLst>
+                                            <p:cond delay="0"/>
+                                          </p:stCondLst>
+                                        </p:cTn>
+                                        <p:tgtEl>
+                                          <p:spTgt spid="93"/>
+                                        </p:tgtEl>
+                                        <p:attrNameLst>
+                                          <p:attrName>style.visibility</p:attrName>
+                                        </p:attrNameLst>
+                                      </p:cBhvr>
+                                      <p:to>
+                                        <p:strVal val="visible"/>
+                                      </p:to>
+                                    </p:set>
+                                    <p:animEffect transition="in" filter="fade">
+                                      <p:cBhvr>
+                                        <p:cTn id="40" dur="2000"/>
+                                        <p:tgtEl>
+                                          <p:spTgt spid="93"/>
+                                        </p:tgtEl>
+                                      </p:cBhvr>
+                                    </p:animEffect>
+                                  </p:childTnLst>
+                                </p:cTn>
+                              </p:par>
+                            </p:childTnLst>
+                          </p:cTn>
+                        </p:par>
+                      </p:childTnLst>
+                    </p:cTn>
+                  </p:par>
+                  <p:par>
+                    <p:cTn id="41" fill="hold">
+                      <p:stCondLst>
+                        <p:cond delay="indefinite"/>
+                      </p:stCondLst>
+                      <p:childTnLst>
+                        <p:par>
+                          <p:cTn id="42" fill="hold">
+                            <p:stCondLst>
+                              <p:cond delay="0"/>
+                            </p:stCondLst>
+                            <p:childTnLst>
+                              <p:par>
+                                <p:cTn id="43" presetID="2" presetClass="entr" presetSubtype="4" fill="hold" grpId="0" nodeType="clickEffect">
+                                  <p:stCondLst>
+                                    <p:cond delay="0"/>
+                                  </p:stCondLst>
+                                  <p:childTnLst>
+                                    <p:set>
+                                      <p:cBhvr>
+                                        <p:cTn id="44" dur="1" fill="hold">
+                                          <p:stCondLst>
+                                            <p:cond delay="0"/>
+                                          </p:stCondLst>
+                                        </p:cTn>
+                                        <p:tgtEl>
+                                          <p:spTgt spid="108"/>
+                                        </p:tgtEl>
+                                        <p:attrNameLst>
+                                          <p:attrName>style.visibility</p:attrName>
+                                        </p:attrNameLst>
+                                      </p:cBhvr>
+                                      <p:to>
+                                        <p:strVal val="visible"/>
+                                      </p:to>
+                                    </p:set>
+                                    <p:anim calcmode="lin" valueType="num">
+                                      <p:cBhvr additive="base">
+                                        <p:cTn id="45" dur="500" fill="hold"/>
+                                        <p:tgtEl>
+                                          <p:spTgt spid="108"/>
+                                        </p:tgtEl>
+                                        <p:attrNameLst>
+                                          <p:attrName>ppt_x</p:attrName>
+                                        </p:attrNameLst>
+                                      </p:cBhvr>
+                                      <p:tavLst>
+                                        <p:tav tm="0">
+                                          <p:val>
+                                            <p:strVal val="#ppt_x"/>
+                                          </p:val>
+                                        </p:tav>
+                                        <p:tav tm="100000">
+                                          <p:val>
+                                            <p:strVal val="#ppt_x"/>
+                                          </p:val>
+                                        </p:tav>
+                                      </p:tavLst>
+                                    </p:anim>
+                                    <p:anim calcmode="lin" valueType="num">
+                                      <p:cBhvr additive="base">
+                                        <p:cTn id="46" dur="500" fill="hold"/>
+                                        <p:tgtEl>
+                                          <p:spTgt spid="108"/>
+                                        </p:tgtEl>
+                                        <p:attrNameLst>
+                                          <p:attrName>ppt_y</p:attrName>
+                                        </p:attrNameLst>
+                                      </p:cBhvr>
+                                      <p:tavLst>
+                                        <p:tav tm="0">
+                                          <p:val>
+                                            <p:strVal val="1+#ppt_h/2"/>
+                                          </p:val>
+                                        </p:tav>
+                                        <p:tav tm="100000">
+                                          <p:val>
+                                            <p:strVal val="#ppt_y"/>
+                                          </p:val>
+                                        </p:tav>
+                                      </p:tavLst>
+                                    </p:anim>
+                                  </p:childTnLst>
+                                </p:cTn>
+                              </p:par>
+                            </p:childTnLst>
+                          </p:cTn>
+                        </p:par>
+                      </p:childTnLst>
+                    </p:cTn>
+                  </p:par>
+                  <p:par>
+                    <p:cTn id="47" fill="hold">
+                      <p:stCondLst>
+                        <p:cond delay="indefinite"/>
+                      </p:stCondLst>
+                      <p:childTnLst>
+                        <p:par>
+                          <p:cTn id="48" fill="hold">
+                            <p:stCondLst>
+                              <p:cond delay="0"/>
+                            </p:stCondLst>
+                            <p:childTnLst>
+                              <p:par>
+                                <p:cTn id="49" presetID="10" presetClass="entr" presetSubtype="0" fill="hold" nodeType="clickEffect">
+                                  <p:stCondLst>
+                                    <p:cond delay="0"/>
+                                  </p:stCondLst>
+                                  <p:childTnLst>
+                                    <p:set>
+                                      <p:cBhvr>
+                                        <p:cTn id="50" dur="1" fill="hold">
+                                          <p:stCondLst>
+                                            <p:cond delay="0"/>
+                                          </p:stCondLst>
+                                        </p:cTn>
+                                        <p:tgtEl>
+                                          <p:spTgt spid="76"/>
+                                        </p:tgtEl>
+                                        <p:attrNameLst>
+                                          <p:attrName>style.visibility</p:attrName>
+                                        </p:attrNameLst>
+                                      </p:cBhvr>
+                                      <p:to>
+                                        <p:strVal val="visible"/>
+                                      </p:to>
+                                    </p:set>
+                                    <p:animEffect transition="in" filter="fade">
+                                      <p:cBhvr>
+                                        <p:cTn id="51" dur="2000"/>
+                                        <p:tgtEl>
+                                          <p:spTgt spid="76"/>
+                                        </p:tgtEl>
+                                      </p:cBhvr>
+                                    </p:animEffect>
+                                  </p:childTnLst>
+                                </p:cTn>
+                              </p:par>
+                              <p:par>
+                                <p:cTn id="52" presetID="10" presetClass="entr" presetSubtype="0" fill="hold" grpId="0" nodeType="withEffect">
+                                  <p:stCondLst>
+                                    <p:cond delay="0"/>
+                                  </p:stCondLst>
+                                  <p:childTnLst>
+                                    <p:set>
+                                      <p:cBhvr>
+                                        <p:cTn id="53" dur="1" fill="hold">
+                                          <p:stCondLst>
+                                            <p:cond delay="0"/>
+                                          </p:stCondLst>
+                                        </p:cTn>
+                                        <p:tgtEl>
+                                          <p:spTgt spid="74"/>
+                                        </p:tgtEl>
+                                        <p:attrNameLst>
+                                          <p:attrName>style.visibility</p:attrName>
+                                        </p:attrNameLst>
+                                      </p:cBhvr>
+                                      <p:to>
+                                        <p:strVal val="visible"/>
+                                      </p:to>
+                                    </p:set>
+                                    <p:animEffect transition="in" filter="fade">
+                                      <p:cBhvr>
+                                        <p:cTn id="54" dur="2000"/>
+                                        <p:tgtEl>
+                                          <p:spTgt spid="74"/>
+                                        </p:tgtEl>
+                                      </p:cBhvr>
+                                    </p:animEffect>
+                                  </p:childTnLst>
+                                </p:cTn>
+                              </p:par>
+                              <p:par>
+                                <p:cTn id="55" presetID="10" presetClass="entr" presetSubtype="0" fill="hold" nodeType="withEffect">
+                                  <p:stCondLst>
+                                    <p:cond delay="0"/>
+                                  </p:stCondLst>
+                                  <p:childTnLst>
+                                    <p:set>
+                                      <p:cBhvr>
+                                        <p:cTn id="56" dur="1" fill="hold">
+                                          <p:stCondLst>
+                                            <p:cond delay="0"/>
+                                          </p:stCondLst>
+                                        </p:cTn>
+                                        <p:tgtEl>
+                                          <p:spTgt spid="83"/>
+                                        </p:tgtEl>
+                                        <p:attrNameLst>
+                                          <p:attrName>style.visibility</p:attrName>
+                                        </p:attrNameLst>
+                                      </p:cBhvr>
+                                      <p:to>
+                                        <p:strVal val="visible"/>
+                                      </p:to>
+                                    </p:set>
+                                    <p:animEffect transition="in" filter="fade">
+                                      <p:cBhvr>
+                                        <p:cTn id="57" dur="2000"/>
+                                        <p:tgtEl>
+                                          <p:spTgt spid="83"/>
+                                        </p:tgtEl>
+                                      </p:cBhvr>
+                                    </p:animEffect>
+                                  </p:childTnLst>
+                                </p:cTn>
+                              </p:par>
+                              <p:par>
+                                <p:cTn id="58" presetID="10" presetClass="entr" presetSubtype="0" fill="hold" grpId="0" nodeType="withEffect">
+                                  <p:stCondLst>
+                                    <p:cond delay="0"/>
+                                  </p:stCondLst>
+                                  <p:childTnLst>
+                                    <p:set>
+                                      <p:cBhvr>
+                                        <p:cTn id="59" dur="1" fill="hold">
+                                          <p:stCondLst>
+                                            <p:cond delay="0"/>
+                                          </p:stCondLst>
+                                        </p:cTn>
+                                        <p:tgtEl>
+                                          <p:spTgt spid="73"/>
+                                        </p:tgtEl>
+                                        <p:attrNameLst>
+                                          <p:attrName>style.visibility</p:attrName>
+                                        </p:attrNameLst>
+                                      </p:cBhvr>
+                                      <p:to>
+                                        <p:strVal val="visible"/>
+                                      </p:to>
+                                    </p:set>
+                                    <p:animEffect transition="in" filter="fade">
+                                      <p:cBhvr>
+                                        <p:cTn id="60" dur="2000"/>
+                                        <p:tgtEl>
+                                          <p:spTgt spid="73"/>
+                                        </p:tgtEl>
+                                      </p:cBhvr>
+                                    </p:animEffect>
+                                  </p:childTnLst>
+                                </p:cTn>
+                              </p:par>
+                              <p:par>
+                                <p:cTn id="61" presetID="10" presetClass="entr" presetSubtype="0" fill="hold" nodeType="withEffect">
+                                  <p:stCondLst>
+                                    <p:cond delay="0"/>
+                                  </p:stCondLst>
+                                  <p:childTnLst>
+                                    <p:set>
+                                      <p:cBhvr>
+                                        <p:cTn id="62" dur="1" fill="hold">
+                                          <p:stCondLst>
+                                            <p:cond delay="0"/>
+                                          </p:stCondLst>
+                                        </p:cTn>
+                                        <p:tgtEl>
+                                          <p:spTgt spid="85"/>
+                                        </p:tgtEl>
+                                        <p:attrNameLst>
+                                          <p:attrName>style.visibility</p:attrName>
+                                        </p:attrNameLst>
+                                      </p:cBhvr>
+                                      <p:to>
+                                        <p:strVal val="visible"/>
+                                      </p:to>
+                                    </p:set>
+                                    <p:animEffect transition="in" filter="fade">
+                                      <p:cBhvr>
+                                        <p:cTn id="63" dur="2000"/>
+                                        <p:tgtEl>
+                                          <p:spTgt spid="85"/>
+                                        </p:tgtEl>
+                                      </p:cBhvr>
+                                    </p:animEffect>
+                                  </p:childTnLst>
+                                </p:cTn>
+                              </p:par>
+                            </p:childTnLst>
+                          </p:cTn>
+                        </p:par>
+                      </p:childTnLst>
+                    </p:cTn>
+                  </p:par>
+                </p:childTnLst>
+              </p:cTn>
+              <p:prevCondLst>
+                <p:cond evt="onPrev" delay="0">
+                  <p:tgtEl>
+                    <p:sldTgt/>
+                  </p:tgtEl>
+                </p:cond>
+              </p:prevCondLst>
+              <p:nextCondLst>
+                <p:cond evt="onNext" delay="0">
+                  <p:tgtEl>
+                    <p:sldTgt/>
+                  </p:tgtEl>
+                </p:cond>
+              </p:nextCondLst>
+            </p:seq>
+          </p:childTnLst>
+        </p:cTn>
       </p:par>
     </p:tnLst>
+    <p:bldLst>
+      <p:bldP spid="73" grpId="0" animBg="1"/>
+      <p:bldP spid="74" grpId="0" animBg="1"/>
+      <p:bldP spid="89" grpId="0" animBg="1"/>
+      <p:bldP spid="91" grpId="0" animBg="1"/>
+      <p:bldP spid="90" grpId="0" animBg="1"/>
+      <p:bldP spid="92" grpId="0" animBg="1"/>
+      <p:bldP spid="93" grpId="0" animBg="1"/>
+      <p:bldP spid="105" grpId="0"/>
+      <p:bldP spid="107" grpId="0"/>
+      <p:bldP spid="108" grpId="0"/>
+    </p:bldLst>
   </p:timing>
 </p:sld>
 </file>

</xml_diff>